<commit_message>
petite modif, je vais essayer de faire marcher ansys, il est capricieux
</commit_message>
<xml_diff>
--- a/03_Rapport/Rapport_Projet.pptx
+++ b/03_Rapport/Rapport_Projet.pptx
@@ -148,1021 +148,13 @@
 <file path=ppt/revisionInfo.xml><?xml version="1.0" encoding="utf-8"?>
 <p1510:revInfo xmlns:a="http://schemas.openxmlformats.org/drawingml/2006/main" xmlns:r="http://schemas.openxmlformats.org/officeDocument/2006/relationships" xmlns:p1510="http://schemas.microsoft.com/office/powerpoint/2015/10/main">
   <p1510:revLst>
-    <p1510:client id="{1404D58C-429C-4D75-B5B2-E1C9B8E0DC36}" v="3359" dt="2025-03-27T21:11:46.081"/>
+    <p1510:client id="{1404D58C-429C-4D75-B5B2-E1C9B8E0DC36}" v="3366" dt="2025-03-28T20:39:29.615"/>
   </p1510:revLst>
 </p1510:revInfo>
 </file>
 
 <file path=ppt/changesInfos/changesInfo1.xml><?xml version="1.0" encoding="utf-8"?>
 <pc:chgInfo xmlns:a="http://schemas.openxmlformats.org/drawingml/2006/main" xmlns:r="http://schemas.openxmlformats.org/officeDocument/2006/relationships" xmlns:ac="http://schemas.microsoft.com/office/drawing/2013/main/command" xmlns:pc="http://schemas.microsoft.com/office/powerpoint/2013/main/command">
-  <pc:docChgLst>
-    <pc:chgData name="François GLEYZON" userId="a2d04f23f7faf3ef" providerId="LiveId" clId="{1404D58C-429C-4D75-B5B2-E1C9B8E0DC36}"/>
-    <pc:docChg chg="undo redo custSel addSld modSld sldOrd">
-      <pc:chgData name="François GLEYZON" userId="a2d04f23f7faf3ef" providerId="LiveId" clId="{1404D58C-429C-4D75-B5B2-E1C9B8E0DC36}" dt="2025-03-27T21:12:56.884" v="8997" actId="20577"/>
-      <pc:docMkLst>
-        <pc:docMk/>
-      </pc:docMkLst>
-      <pc:sldChg chg="addSp delSp modSp mod">
-        <pc:chgData name="François GLEYZON" userId="a2d04f23f7faf3ef" providerId="LiveId" clId="{1404D58C-429C-4D75-B5B2-E1C9B8E0DC36}" dt="2025-03-27T15:44:38.844" v="7178" actId="113"/>
-        <pc:sldMkLst>
-          <pc:docMk/>
-          <pc:sldMk cId="2801290844" sldId="256"/>
-        </pc:sldMkLst>
-        <pc:spChg chg="mod">
-          <ac:chgData name="François GLEYZON" userId="a2d04f23f7faf3ef" providerId="LiveId" clId="{1404D58C-429C-4D75-B5B2-E1C9B8E0DC36}" dt="2025-03-27T15:44:38.844" v="7178" actId="113"/>
-          <ac:spMkLst>
-            <pc:docMk/>
-            <pc:sldMk cId="2801290844" sldId="256"/>
-            <ac:spMk id="5" creationId="{CCB64622-7D99-EF9C-E64A-6B7A68B130E7}"/>
-          </ac:spMkLst>
-        </pc:spChg>
-        <pc:spChg chg="mod">
-          <ac:chgData name="François GLEYZON" userId="a2d04f23f7faf3ef" providerId="LiveId" clId="{1404D58C-429C-4D75-B5B2-E1C9B8E0DC36}" dt="2025-03-27T15:44:33.534" v="7177" actId="1035"/>
-          <ac:spMkLst>
-            <pc:docMk/>
-            <pc:sldMk cId="2801290844" sldId="256"/>
-            <ac:spMk id="11" creationId="{ADA3B4ED-F9F9-8357-018A-C931A9829ED9}"/>
-          </ac:spMkLst>
-        </pc:spChg>
-        <pc:spChg chg="add mod">
-          <ac:chgData name="François GLEYZON" userId="a2d04f23f7faf3ef" providerId="LiveId" clId="{1404D58C-429C-4D75-B5B2-E1C9B8E0DC36}" dt="2025-03-16T14:36:30.969" v="1516"/>
-          <ac:spMkLst>
-            <pc:docMk/>
-            <pc:sldMk cId="2801290844" sldId="256"/>
-            <ac:spMk id="12" creationId="{B3FBCD95-757E-0D30-1DE3-8FB709355D99}"/>
-          </ac:spMkLst>
-        </pc:spChg>
-        <pc:spChg chg="mod">
-          <ac:chgData name="François GLEYZON" userId="a2d04f23f7faf3ef" providerId="LiveId" clId="{1404D58C-429C-4D75-B5B2-E1C9B8E0DC36}" dt="2025-03-27T15:44:33.534" v="7177" actId="1035"/>
-          <ac:spMkLst>
-            <pc:docMk/>
-            <pc:sldMk cId="2801290844" sldId="256"/>
-            <ac:spMk id="13" creationId="{2A150A6C-B8B3-44CE-8884-B81C5AD95D13}"/>
-          </ac:spMkLst>
-        </pc:spChg>
-      </pc:sldChg>
-      <pc:sldChg chg="addSp delSp mod">
-        <pc:chgData name="François GLEYZON" userId="a2d04f23f7faf3ef" providerId="LiveId" clId="{1404D58C-429C-4D75-B5B2-E1C9B8E0DC36}" dt="2025-03-16T14:16:57.551" v="36" actId="22"/>
-        <pc:sldMkLst>
-          <pc:docMk/>
-          <pc:sldMk cId="2487955664" sldId="257"/>
-        </pc:sldMkLst>
-      </pc:sldChg>
-      <pc:sldChg chg="addSp delSp modSp mod">
-        <pc:chgData name="François GLEYZON" userId="a2d04f23f7faf3ef" providerId="LiveId" clId="{1404D58C-429C-4D75-B5B2-E1C9B8E0DC36}" dt="2025-03-16T18:23:45.777" v="6935" actId="20577"/>
-        <pc:sldMkLst>
-          <pc:docMk/>
-          <pc:sldMk cId="1966793551" sldId="265"/>
-        </pc:sldMkLst>
-        <pc:spChg chg="mod">
-          <ac:chgData name="François GLEYZON" userId="a2d04f23f7faf3ef" providerId="LiveId" clId="{1404D58C-429C-4D75-B5B2-E1C9B8E0DC36}" dt="2025-03-16T14:17:32.286" v="61" actId="20577"/>
-          <ac:spMkLst>
-            <pc:docMk/>
-            <pc:sldMk cId="1966793551" sldId="265"/>
-            <ac:spMk id="9" creationId="{6E9846D3-47A3-2AE6-6383-AB77CC5B517E}"/>
-          </ac:spMkLst>
-        </pc:spChg>
-        <pc:spChg chg="add mod">
-          <ac:chgData name="François GLEYZON" userId="a2d04f23f7faf3ef" providerId="LiveId" clId="{1404D58C-429C-4D75-B5B2-E1C9B8E0DC36}" dt="2025-03-16T14:24:23.045" v="574" actId="20577"/>
-          <ac:spMkLst>
-            <pc:docMk/>
-            <pc:sldMk cId="1966793551" sldId="265"/>
-            <ac:spMk id="11" creationId="{072A0C86-E46F-7872-4F73-D0C64405F9A7}"/>
-          </ac:spMkLst>
-        </pc:spChg>
-        <pc:spChg chg="add mod">
-          <ac:chgData name="François GLEYZON" userId="a2d04f23f7faf3ef" providerId="LiveId" clId="{1404D58C-429C-4D75-B5B2-E1C9B8E0DC36}" dt="2025-03-16T18:23:45.777" v="6935" actId="20577"/>
-          <ac:spMkLst>
-            <pc:docMk/>
-            <pc:sldMk cId="1966793551" sldId="265"/>
-            <ac:spMk id="28" creationId="{A3F4CAB7-21CC-3B13-8827-56C233CE43A0}"/>
-          </ac:spMkLst>
-        </pc:spChg>
-        <pc:spChg chg="add mod">
-          <ac:chgData name="François GLEYZON" userId="a2d04f23f7faf3ef" providerId="LiveId" clId="{1404D58C-429C-4D75-B5B2-E1C9B8E0DC36}" dt="2025-03-16T14:28:50.048" v="782" actId="14100"/>
-          <ac:spMkLst>
-            <pc:docMk/>
-            <pc:sldMk cId="1966793551" sldId="265"/>
-            <ac:spMk id="29" creationId="{16F0C38C-ADF0-05C8-AB97-6D861D171C8A}"/>
-          </ac:spMkLst>
-        </pc:spChg>
-        <pc:spChg chg="add mod">
-          <ac:chgData name="François GLEYZON" userId="a2d04f23f7faf3ef" providerId="LiveId" clId="{1404D58C-429C-4D75-B5B2-E1C9B8E0DC36}" dt="2025-03-16T14:37:03.623" v="1524" actId="164"/>
-          <ac:spMkLst>
-            <pc:docMk/>
-            <pc:sldMk cId="1966793551" sldId="265"/>
-            <ac:spMk id="30" creationId="{F9012EBE-327E-81BA-D0CC-DFFC3A81D06E}"/>
-          </ac:spMkLst>
-        </pc:spChg>
-        <pc:spChg chg="add mod">
-          <ac:chgData name="François GLEYZON" userId="a2d04f23f7faf3ef" providerId="LiveId" clId="{1404D58C-429C-4D75-B5B2-E1C9B8E0DC36}" dt="2025-03-16T14:37:03.623" v="1524" actId="164"/>
-          <ac:spMkLst>
-            <pc:docMk/>
-            <pc:sldMk cId="1966793551" sldId="265"/>
-            <ac:spMk id="31" creationId="{E096CA17-3B37-1EC9-086C-6073F9F0E327}"/>
-          </ac:spMkLst>
-        </pc:spChg>
-        <pc:spChg chg="add mod">
-          <ac:chgData name="François GLEYZON" userId="a2d04f23f7faf3ef" providerId="LiveId" clId="{1404D58C-429C-4D75-B5B2-E1C9B8E0DC36}" dt="2025-03-16T14:36:12.133" v="1510" actId="20577"/>
-          <ac:spMkLst>
-            <pc:docMk/>
-            <pc:sldMk cId="1966793551" sldId="265"/>
-            <ac:spMk id="48" creationId="{4BF5205A-C21B-DC10-00D1-30EE1B56E60B}"/>
-          </ac:spMkLst>
-        </pc:spChg>
-        <pc:spChg chg="add mod">
-          <ac:chgData name="François GLEYZON" userId="a2d04f23f7faf3ef" providerId="LiveId" clId="{1404D58C-429C-4D75-B5B2-E1C9B8E0DC36}" dt="2025-03-16T14:36:25.253" v="1514" actId="20577"/>
-          <ac:spMkLst>
-            <pc:docMk/>
-            <pc:sldMk cId="1966793551" sldId="265"/>
-            <ac:spMk id="49" creationId="{A79242B3-F8EA-94FD-D9D9-2D85B18818DC}"/>
-          </ac:spMkLst>
-        </pc:spChg>
-        <pc:grpChg chg="add mod">
-          <ac:chgData name="François GLEYZON" userId="a2d04f23f7faf3ef" providerId="LiveId" clId="{1404D58C-429C-4D75-B5B2-E1C9B8E0DC36}" dt="2025-03-16T14:37:08.843" v="1548" actId="1038"/>
-          <ac:grpSpMkLst>
-            <pc:docMk/>
-            <pc:sldMk cId="1966793551" sldId="265"/>
-            <ac:grpSpMk id="50" creationId="{6D300C5F-060B-A29B-5E63-8AB2F8289D3E}"/>
-          </ac:grpSpMkLst>
-        </pc:grpChg>
-        <pc:picChg chg="add mod">
-          <ac:chgData name="François GLEYZON" userId="a2d04f23f7faf3ef" providerId="LiveId" clId="{1404D58C-429C-4D75-B5B2-E1C9B8E0DC36}" dt="2025-03-16T14:37:03.623" v="1524" actId="164"/>
-          <ac:picMkLst>
-            <pc:docMk/>
-            <pc:sldMk cId="1966793551" sldId="265"/>
-            <ac:picMk id="16" creationId="{C8511678-E88F-7D51-904A-00D5D2E20854}"/>
-          </ac:picMkLst>
-        </pc:picChg>
-        <pc:picChg chg="add mod">
-          <ac:chgData name="François GLEYZON" userId="a2d04f23f7faf3ef" providerId="LiveId" clId="{1404D58C-429C-4D75-B5B2-E1C9B8E0DC36}" dt="2025-03-16T14:37:03.623" v="1524" actId="164"/>
-          <ac:picMkLst>
-            <pc:docMk/>
-            <pc:sldMk cId="1966793551" sldId="265"/>
-            <ac:picMk id="22" creationId="{E271FBCE-EB1D-54CC-CAFB-7E1DFF99CA2E}"/>
-          </ac:picMkLst>
-        </pc:picChg>
-      </pc:sldChg>
-      <pc:sldChg chg="add ord">
-        <pc:chgData name="François GLEYZON" userId="a2d04f23f7faf3ef" providerId="LiveId" clId="{1404D58C-429C-4D75-B5B2-E1C9B8E0DC36}" dt="2025-03-16T14:17:18.713" v="44"/>
-        <pc:sldMkLst>
-          <pc:docMk/>
-          <pc:sldMk cId="3204585435" sldId="267"/>
-        </pc:sldMkLst>
-      </pc:sldChg>
-      <pc:sldChg chg="addSp modSp new mod">
-        <pc:chgData name="François GLEYZON" userId="a2d04f23f7faf3ef" providerId="LiveId" clId="{1404D58C-429C-4D75-B5B2-E1C9B8E0DC36}" dt="2025-03-16T14:17:16.283" v="42" actId="207"/>
-        <pc:sldMkLst>
-          <pc:docMk/>
-          <pc:sldMk cId="1821676052" sldId="268"/>
-        </pc:sldMkLst>
-        <pc:spChg chg="add mod">
-          <ac:chgData name="François GLEYZON" userId="a2d04f23f7faf3ef" providerId="LiveId" clId="{1404D58C-429C-4D75-B5B2-E1C9B8E0DC36}" dt="2025-03-16T14:17:16.283" v="42" actId="207"/>
-          <ac:spMkLst>
-            <pc:docMk/>
-            <pc:sldMk cId="1821676052" sldId="268"/>
-            <ac:spMk id="2" creationId="{CE60E174-1138-FE64-FEE9-6D62A3AC6AD5}"/>
-          </ac:spMkLst>
-        </pc:spChg>
-      </pc:sldChg>
-      <pc:sldChg chg="addSp modSp add mod">
-        <pc:chgData name="François GLEYZON" userId="a2d04f23f7faf3ef" providerId="LiveId" clId="{1404D58C-429C-4D75-B5B2-E1C9B8E0DC36}" dt="2025-03-27T15:47:44.026" v="7434" actId="1037"/>
-        <pc:sldMkLst>
-          <pc:docMk/>
-          <pc:sldMk cId="2830059827" sldId="269"/>
-        </pc:sldMkLst>
-        <pc:spChg chg="add mod">
-          <ac:chgData name="François GLEYZON" userId="a2d04f23f7faf3ef" providerId="LiveId" clId="{1404D58C-429C-4D75-B5B2-E1C9B8E0DC36}" dt="2025-03-16T14:36:36.203" v="1519"/>
-          <ac:spMkLst>
-            <pc:docMk/>
-            <pc:sldMk cId="2830059827" sldId="269"/>
-            <ac:spMk id="2" creationId="{80394A4F-406B-36BD-74F1-B5D4E71043BB}"/>
-          </ac:spMkLst>
-        </pc:spChg>
-        <pc:spChg chg="add mod">
-          <ac:chgData name="François GLEYZON" userId="a2d04f23f7faf3ef" providerId="LiveId" clId="{1404D58C-429C-4D75-B5B2-E1C9B8E0DC36}" dt="2025-03-16T15:10:21.692" v="2647" actId="113"/>
-          <ac:spMkLst>
-            <pc:docMk/>
-            <pc:sldMk cId="2830059827" sldId="269"/>
-            <ac:spMk id="3" creationId="{1C52FBAC-7EC8-BE7C-95EC-C16D6E8AF899}"/>
-          </ac:spMkLst>
-        </pc:spChg>
-        <pc:spChg chg="add mod">
-          <ac:chgData name="François GLEYZON" userId="a2d04f23f7faf3ef" providerId="LiveId" clId="{1404D58C-429C-4D75-B5B2-E1C9B8E0DC36}" dt="2025-03-16T15:06:51.653" v="2533" actId="1035"/>
-          <ac:spMkLst>
-            <pc:docMk/>
-            <pc:sldMk cId="2830059827" sldId="269"/>
-            <ac:spMk id="4" creationId="{78B77FF1-8B2E-A1A3-EF89-C57622AB1454}"/>
-          </ac:spMkLst>
-        </pc:spChg>
-        <pc:spChg chg="add mod">
-          <ac:chgData name="François GLEYZON" userId="a2d04f23f7faf3ef" providerId="LiveId" clId="{1404D58C-429C-4D75-B5B2-E1C9B8E0DC36}" dt="2025-03-16T15:06:51.653" v="2533" actId="1035"/>
-          <ac:spMkLst>
-            <pc:docMk/>
-            <pc:sldMk cId="2830059827" sldId="269"/>
-            <ac:spMk id="5" creationId="{739A139A-CC56-81D5-3FFE-43CECF04B84D}"/>
-          </ac:spMkLst>
-        </pc:spChg>
-        <pc:spChg chg="add mod">
-          <ac:chgData name="François GLEYZON" userId="a2d04f23f7faf3ef" providerId="LiveId" clId="{1404D58C-429C-4D75-B5B2-E1C9B8E0DC36}" dt="2025-03-16T15:06:51.653" v="2533" actId="1035"/>
-          <ac:spMkLst>
-            <pc:docMk/>
-            <pc:sldMk cId="2830059827" sldId="269"/>
-            <ac:spMk id="6" creationId="{A343BD2D-3517-D6F9-AED8-67B2A11B82DC}"/>
-          </ac:spMkLst>
-        </pc:spChg>
-        <pc:spChg chg="add mod">
-          <ac:chgData name="François GLEYZON" userId="a2d04f23f7faf3ef" providerId="LiveId" clId="{1404D58C-429C-4D75-B5B2-E1C9B8E0DC36}" dt="2025-03-16T15:09:51.483" v="2643" actId="1076"/>
-          <ac:spMkLst>
-            <pc:docMk/>
-            <pc:sldMk cId="2830059827" sldId="269"/>
-            <ac:spMk id="7" creationId="{2AD06AC7-B335-02C5-39E6-6F2C36E7AA8C}"/>
-          </ac:spMkLst>
-        </pc:spChg>
-        <pc:spChg chg="add mod">
-          <ac:chgData name="François GLEYZON" userId="a2d04f23f7faf3ef" providerId="LiveId" clId="{1404D58C-429C-4D75-B5B2-E1C9B8E0DC36}" dt="2025-03-27T15:47:37.838" v="7428" actId="14100"/>
-          <ac:spMkLst>
-            <pc:docMk/>
-            <pc:sldMk cId="2830059827" sldId="269"/>
-            <ac:spMk id="8" creationId="{F42AAFE0-6C2A-03C7-A118-435301C2CC37}"/>
-          </ac:spMkLst>
-        </pc:spChg>
-        <pc:spChg chg="add mod">
-          <ac:chgData name="François GLEYZON" userId="a2d04f23f7faf3ef" providerId="LiveId" clId="{1404D58C-429C-4D75-B5B2-E1C9B8E0DC36}" dt="2025-03-16T15:25:15.576" v="3276" actId="113"/>
-          <ac:spMkLst>
-            <pc:docMk/>
-            <pc:sldMk cId="2830059827" sldId="269"/>
-            <ac:spMk id="11" creationId="{80852BB1-1AEF-BA63-A523-0B2E23F62449}"/>
-          </ac:spMkLst>
-        </pc:spChg>
-        <pc:spChg chg="add mod">
-          <ac:chgData name="François GLEYZON" userId="a2d04f23f7faf3ef" providerId="LiveId" clId="{1404D58C-429C-4D75-B5B2-E1C9B8E0DC36}" dt="2025-03-16T18:28:40.057" v="7126" actId="113"/>
-          <ac:spMkLst>
-            <pc:docMk/>
-            <pc:sldMk cId="2830059827" sldId="269"/>
-            <ac:spMk id="17" creationId="{D1FEB786-966B-0D83-37C9-2EBFF8D0D322}"/>
-          </ac:spMkLst>
-        </pc:spChg>
-        <pc:spChg chg="add mod">
-          <ac:chgData name="François GLEYZON" userId="a2d04f23f7faf3ef" providerId="LiveId" clId="{1404D58C-429C-4D75-B5B2-E1C9B8E0DC36}" dt="2025-03-16T15:14:56.424" v="2791" actId="1076"/>
-          <ac:spMkLst>
-            <pc:docMk/>
-            <pc:sldMk cId="2830059827" sldId="269"/>
-            <ac:spMk id="18" creationId="{2DA8E8F2-2AF9-DB7D-FA62-83A39D6661D9}"/>
-          </ac:spMkLst>
-        </pc:spChg>
-        <pc:spChg chg="add mod">
-          <ac:chgData name="François GLEYZON" userId="a2d04f23f7faf3ef" providerId="LiveId" clId="{1404D58C-429C-4D75-B5B2-E1C9B8E0DC36}" dt="2025-03-16T15:14:59.278" v="2792" actId="20577"/>
-          <ac:spMkLst>
-            <pc:docMk/>
-            <pc:sldMk cId="2830059827" sldId="269"/>
-            <ac:spMk id="19" creationId="{EEC0C2AA-6F3D-50A5-6859-E9FF640D7681}"/>
-          </ac:spMkLst>
-        </pc:spChg>
-        <pc:spChg chg="add mod">
-          <ac:chgData name="François GLEYZON" userId="a2d04f23f7faf3ef" providerId="LiveId" clId="{1404D58C-429C-4D75-B5B2-E1C9B8E0DC36}" dt="2025-03-16T15:15:33.082" v="2879" actId="20577"/>
-          <ac:spMkLst>
-            <pc:docMk/>
-            <pc:sldMk cId="2830059827" sldId="269"/>
-            <ac:spMk id="21" creationId="{52EED8E5-7326-32DB-C13F-1498B2A40CDF}"/>
-          </ac:spMkLst>
-        </pc:spChg>
-        <pc:spChg chg="add mod">
-          <ac:chgData name="François GLEYZON" userId="a2d04f23f7faf3ef" providerId="LiveId" clId="{1404D58C-429C-4D75-B5B2-E1C9B8E0DC36}" dt="2025-03-16T15:19:24.017" v="3044" actId="1076"/>
-          <ac:spMkLst>
-            <pc:docMk/>
-            <pc:sldMk cId="2830059827" sldId="269"/>
-            <ac:spMk id="24" creationId="{BD3233B2-F816-A13E-92F5-924BA2130E34}"/>
-          </ac:spMkLst>
-        </pc:spChg>
-        <pc:spChg chg="add mod">
-          <ac:chgData name="François GLEYZON" userId="a2d04f23f7faf3ef" providerId="LiveId" clId="{1404D58C-429C-4D75-B5B2-E1C9B8E0DC36}" dt="2025-03-27T15:47:18.234" v="7423"/>
-          <ac:spMkLst>
-            <pc:docMk/>
-            <pc:sldMk cId="2830059827" sldId="269"/>
-            <ac:spMk id="25" creationId="{5FCF3EA4-1C17-404E-D7DC-4DCD39E349EE}"/>
-          </ac:spMkLst>
-        </pc:spChg>
-        <pc:picChg chg="add mod">
-          <ac:chgData name="François GLEYZON" userId="a2d04f23f7faf3ef" providerId="LiveId" clId="{1404D58C-429C-4D75-B5B2-E1C9B8E0DC36}" dt="2025-03-27T15:47:44.026" v="7434" actId="1037"/>
-          <ac:picMkLst>
-            <pc:docMk/>
-            <pc:sldMk cId="2830059827" sldId="269"/>
-            <ac:picMk id="1026" creationId="{631B88E2-7308-4AA9-E4DD-AC0360CF9821}"/>
-          </ac:picMkLst>
-        </pc:picChg>
-        <pc:cxnChg chg="add mod">
-          <ac:chgData name="François GLEYZON" userId="a2d04f23f7faf3ef" providerId="LiveId" clId="{1404D58C-429C-4D75-B5B2-E1C9B8E0DC36}" dt="2025-03-16T15:10:55.005" v="2660" actId="20577"/>
-          <ac:cxnSpMkLst>
-            <pc:docMk/>
-            <pc:sldMk cId="2830059827" sldId="269"/>
-            <ac:cxnSpMk id="10" creationId="{FA3DA1B2-AD0A-283D-1F5D-AD9276E7401C}"/>
-          </ac:cxnSpMkLst>
-        </pc:cxnChg>
-        <pc:cxnChg chg="add mod">
-          <ac:chgData name="François GLEYZON" userId="a2d04f23f7faf3ef" providerId="LiveId" clId="{1404D58C-429C-4D75-B5B2-E1C9B8E0DC36}" dt="2025-03-16T15:15:39.872" v="2882" actId="14100"/>
-          <ac:cxnSpMkLst>
-            <pc:docMk/>
-            <pc:sldMk cId="2830059827" sldId="269"/>
-            <ac:cxnSpMk id="20" creationId="{EFED52EE-D353-671B-312B-C6260B9FA771}"/>
-          </ac:cxnSpMkLst>
-        </pc:cxnChg>
-      </pc:sldChg>
-      <pc:sldChg chg="addSp modSp add mod">
-        <pc:chgData name="François GLEYZON" userId="a2d04f23f7faf3ef" providerId="LiveId" clId="{1404D58C-429C-4D75-B5B2-E1C9B8E0DC36}" dt="2025-03-16T14:36:37.943" v="1520"/>
-        <pc:sldMkLst>
-          <pc:docMk/>
-          <pc:sldMk cId="3668441629" sldId="270"/>
-        </pc:sldMkLst>
-        <pc:spChg chg="add mod">
-          <ac:chgData name="François GLEYZON" userId="a2d04f23f7faf3ef" providerId="LiveId" clId="{1404D58C-429C-4D75-B5B2-E1C9B8E0DC36}" dt="2025-03-16T14:36:37.943" v="1520"/>
-          <ac:spMkLst>
-            <pc:docMk/>
-            <pc:sldMk cId="3668441629" sldId="270"/>
-            <ac:spMk id="2" creationId="{59F282F9-3609-1522-0AA2-327E0A7E7A9B}"/>
-          </ac:spMkLst>
-        </pc:spChg>
-        <pc:spChg chg="mod">
-          <ac:chgData name="François GLEYZON" userId="a2d04f23f7faf3ef" providerId="LiveId" clId="{1404D58C-429C-4D75-B5B2-E1C9B8E0DC36}" dt="2025-03-16T14:17:42.635" v="76" actId="20577"/>
-          <ac:spMkLst>
-            <pc:docMk/>
-            <pc:sldMk cId="3668441629" sldId="270"/>
-            <ac:spMk id="9" creationId="{9D2D06DC-6CE6-B872-3049-9B0D28F68101}"/>
-          </ac:spMkLst>
-        </pc:spChg>
-      </pc:sldChg>
-      <pc:sldChg chg="addSp modSp add mod">
-        <pc:chgData name="François GLEYZON" userId="a2d04f23f7faf3ef" providerId="LiveId" clId="{1404D58C-429C-4D75-B5B2-E1C9B8E0DC36}" dt="2025-03-16T14:36:40.083" v="1521"/>
-        <pc:sldMkLst>
-          <pc:docMk/>
-          <pc:sldMk cId="1301843568" sldId="271"/>
-        </pc:sldMkLst>
-        <pc:spChg chg="add mod">
-          <ac:chgData name="François GLEYZON" userId="a2d04f23f7faf3ef" providerId="LiveId" clId="{1404D58C-429C-4D75-B5B2-E1C9B8E0DC36}" dt="2025-03-16T14:36:40.083" v="1521"/>
-          <ac:spMkLst>
-            <pc:docMk/>
-            <pc:sldMk cId="1301843568" sldId="271"/>
-            <ac:spMk id="2" creationId="{B03F54C8-C74E-296C-FF98-648447B3C076}"/>
-          </ac:spMkLst>
-        </pc:spChg>
-        <pc:spChg chg="mod">
-          <ac:chgData name="François GLEYZON" userId="a2d04f23f7faf3ef" providerId="LiveId" clId="{1404D58C-429C-4D75-B5B2-E1C9B8E0DC36}" dt="2025-03-16T14:17:52.241" v="97" actId="20577"/>
-          <ac:spMkLst>
-            <pc:docMk/>
-            <pc:sldMk cId="1301843568" sldId="271"/>
-            <ac:spMk id="9" creationId="{9AC59951-2052-5891-EC5A-4BBED090FE92}"/>
-          </ac:spMkLst>
-        </pc:spChg>
-      </pc:sldChg>
-      <pc:sldChg chg="addSp delSp modSp add mod">
-        <pc:chgData name="François GLEYZON" userId="a2d04f23f7faf3ef" providerId="LiveId" clId="{1404D58C-429C-4D75-B5B2-E1C9B8E0DC36}" dt="2025-03-16T18:21:18.427" v="6846" actId="1038"/>
-        <pc:sldMkLst>
-          <pc:docMk/>
-          <pc:sldMk cId="1767245589" sldId="272"/>
-        </pc:sldMkLst>
-        <pc:spChg chg="add mod">
-          <ac:chgData name="François GLEYZON" userId="a2d04f23f7faf3ef" providerId="LiveId" clId="{1404D58C-429C-4D75-B5B2-E1C9B8E0DC36}" dt="2025-03-16T14:36:41.923" v="1522"/>
-          <ac:spMkLst>
-            <pc:docMk/>
-            <pc:sldMk cId="1767245589" sldId="272"/>
-            <ac:spMk id="2" creationId="{281E66B3-EC50-1DB7-5246-A0A1D85B27B2}"/>
-          </ac:spMkLst>
-        </pc:spChg>
-        <pc:spChg chg="add mod">
-          <ac:chgData name="François GLEYZON" userId="a2d04f23f7faf3ef" providerId="LiveId" clId="{1404D58C-429C-4D75-B5B2-E1C9B8E0DC36}" dt="2025-03-16T17:38:31.338" v="3598" actId="113"/>
-          <ac:spMkLst>
-            <pc:docMk/>
-            <pc:sldMk cId="1767245589" sldId="272"/>
-            <ac:spMk id="5" creationId="{E13FB8D1-D18F-47C7-D1B2-4705A4773972}"/>
-          </ac:spMkLst>
-        </pc:spChg>
-        <pc:spChg chg="add mod">
-          <ac:chgData name="François GLEYZON" userId="a2d04f23f7faf3ef" providerId="LiveId" clId="{1404D58C-429C-4D75-B5B2-E1C9B8E0DC36}" dt="2025-03-16T17:43:23.848" v="3944" actId="20577"/>
-          <ac:spMkLst>
-            <pc:docMk/>
-            <pc:sldMk cId="1767245589" sldId="272"/>
-            <ac:spMk id="6" creationId="{9D3F7280-79FE-6679-FD09-21759D67BD31}"/>
-          </ac:spMkLst>
-        </pc:spChg>
-        <pc:spChg chg="mod">
-          <ac:chgData name="François GLEYZON" userId="a2d04f23f7faf3ef" providerId="LiveId" clId="{1404D58C-429C-4D75-B5B2-E1C9B8E0DC36}" dt="2025-03-16T14:18:01.236" v="108" actId="20577"/>
-          <ac:spMkLst>
-            <pc:docMk/>
-            <pc:sldMk cId="1767245589" sldId="272"/>
-            <ac:spMk id="9" creationId="{D60C7752-751C-B280-204E-C5F5E4B10805}"/>
-          </ac:spMkLst>
-        </pc:spChg>
-        <pc:spChg chg="add mod">
-          <ac:chgData name="François GLEYZON" userId="a2d04f23f7faf3ef" providerId="LiveId" clId="{1404D58C-429C-4D75-B5B2-E1C9B8E0DC36}" dt="2025-03-16T18:02:10.159" v="6248" actId="1076"/>
-          <ac:spMkLst>
-            <pc:docMk/>
-            <pc:sldMk cId="1767245589" sldId="272"/>
-            <ac:spMk id="10" creationId="{FB7FDD76-3978-200B-32AC-62FEBBC52D44}"/>
-          </ac:spMkLst>
-        </pc:spChg>
-        <pc:spChg chg="add mod">
-          <ac:chgData name="François GLEYZON" userId="a2d04f23f7faf3ef" providerId="LiveId" clId="{1404D58C-429C-4D75-B5B2-E1C9B8E0DC36}" dt="2025-03-16T18:02:15.543" v="6249" actId="465"/>
-          <ac:spMkLst>
-            <pc:docMk/>
-            <pc:sldMk cId="1767245589" sldId="272"/>
-            <ac:spMk id="11" creationId="{1A607B03-1BC0-C771-595F-432338076A8B}"/>
-          </ac:spMkLst>
-        </pc:spChg>
-        <pc:spChg chg="add mod">
-          <ac:chgData name="François GLEYZON" userId="a2d04f23f7faf3ef" providerId="LiveId" clId="{1404D58C-429C-4D75-B5B2-E1C9B8E0DC36}" dt="2025-03-16T18:02:10.159" v="6248" actId="1076"/>
-          <ac:spMkLst>
-            <pc:docMk/>
-            <pc:sldMk cId="1767245589" sldId="272"/>
-            <ac:spMk id="12" creationId="{EEF1FBAD-7C20-C706-E6A5-B20EBC80F0F6}"/>
-          </ac:spMkLst>
-        </pc:spChg>
-        <pc:spChg chg="add mod">
-          <ac:chgData name="François GLEYZON" userId="a2d04f23f7faf3ef" providerId="LiveId" clId="{1404D58C-429C-4D75-B5B2-E1C9B8E0DC36}" dt="2025-03-16T18:09:11.697" v="6453" actId="1076"/>
-          <ac:spMkLst>
-            <pc:docMk/>
-            <pc:sldMk cId="1767245589" sldId="272"/>
-            <ac:spMk id="41" creationId="{DFB335B7-5A67-A708-9BF0-15568CAD7AA8}"/>
-          </ac:spMkLst>
-        </pc:spChg>
-        <pc:spChg chg="add mod">
-          <ac:chgData name="François GLEYZON" userId="a2d04f23f7faf3ef" providerId="LiveId" clId="{1404D58C-429C-4D75-B5B2-E1C9B8E0DC36}" dt="2025-03-16T18:21:18.427" v="6846" actId="1038"/>
-          <ac:spMkLst>
-            <pc:docMk/>
-            <pc:sldMk cId="1767245589" sldId="272"/>
-            <ac:spMk id="42" creationId="{2585DC19-B449-1015-A282-9C33F7EDCA40}"/>
-          </ac:spMkLst>
-        </pc:spChg>
-        <pc:picChg chg="add mod">
-          <ac:chgData name="François GLEYZON" userId="a2d04f23f7faf3ef" providerId="LiveId" clId="{1404D58C-429C-4D75-B5B2-E1C9B8E0DC36}" dt="2025-03-16T17:38:33.760" v="3599" actId="1076"/>
-          <ac:picMkLst>
-            <pc:docMk/>
-            <pc:sldMk cId="1767245589" sldId="272"/>
-            <ac:picMk id="4" creationId="{53ED0A81-57CD-C16F-8A9A-2BCDAA3F406E}"/>
-          </ac:picMkLst>
-        </pc:picChg>
-        <pc:picChg chg="add mod">
-          <ac:chgData name="François GLEYZON" userId="a2d04f23f7faf3ef" providerId="LiveId" clId="{1404D58C-429C-4D75-B5B2-E1C9B8E0DC36}" dt="2025-03-16T18:02:22.290" v="6250" actId="1076"/>
-          <ac:picMkLst>
-            <pc:docMk/>
-            <pc:sldMk cId="1767245589" sldId="272"/>
-            <ac:picMk id="8" creationId="{8A31FEA3-15F3-A5B2-8631-79D870FD9189}"/>
-          </ac:picMkLst>
-        </pc:picChg>
-        <pc:picChg chg="add mod">
-          <ac:chgData name="François GLEYZON" userId="a2d04f23f7faf3ef" providerId="LiveId" clId="{1404D58C-429C-4D75-B5B2-E1C9B8E0DC36}" dt="2025-03-16T18:06:56.413" v="6270" actId="1076"/>
-          <ac:picMkLst>
-            <pc:docMk/>
-            <pc:sldMk cId="1767245589" sldId="272"/>
-            <ac:picMk id="25" creationId="{33ED872E-179F-A9C0-F2A5-3AD41FFB9EF1}"/>
-          </ac:picMkLst>
-        </pc:picChg>
-        <pc:cxnChg chg="add mod">
-          <ac:chgData name="François GLEYZON" userId="a2d04f23f7faf3ef" providerId="LiveId" clId="{1404D58C-429C-4D75-B5B2-E1C9B8E0DC36}" dt="2025-03-16T18:02:32.678" v="6253" actId="14100"/>
-          <ac:cxnSpMkLst>
-            <pc:docMk/>
-            <pc:sldMk cId="1767245589" sldId="272"/>
-            <ac:cxnSpMk id="13" creationId="{D49B9546-9E06-3F1B-67AE-CDE54685608B}"/>
-          </ac:cxnSpMkLst>
-        </pc:cxnChg>
-        <pc:cxnChg chg="add mod">
-          <ac:chgData name="François GLEYZON" userId="a2d04f23f7faf3ef" providerId="LiveId" clId="{1404D58C-429C-4D75-B5B2-E1C9B8E0DC36}" dt="2025-03-16T18:02:38.187" v="6256" actId="14100"/>
-          <ac:cxnSpMkLst>
-            <pc:docMk/>
-            <pc:sldMk cId="1767245589" sldId="272"/>
-            <ac:cxnSpMk id="16" creationId="{80972539-C73D-4278-5BF7-104942B2DDC7}"/>
-          </ac:cxnSpMkLst>
-        </pc:cxnChg>
-        <pc:cxnChg chg="add mod">
-          <ac:chgData name="François GLEYZON" userId="a2d04f23f7faf3ef" providerId="LiveId" clId="{1404D58C-429C-4D75-B5B2-E1C9B8E0DC36}" dt="2025-03-16T18:02:56.302" v="6263" actId="1076"/>
-          <ac:cxnSpMkLst>
-            <pc:docMk/>
-            <pc:sldMk cId="1767245589" sldId="272"/>
-            <ac:cxnSpMk id="22" creationId="{5F64B1CF-78E3-E145-2A94-E4E959096099}"/>
-          </ac:cxnSpMkLst>
-        </pc:cxnChg>
-        <pc:cxnChg chg="add mod">
-          <ac:chgData name="François GLEYZON" userId="a2d04f23f7faf3ef" providerId="LiveId" clId="{1404D58C-429C-4D75-B5B2-E1C9B8E0DC36}" dt="2025-03-16T18:07:23.828" v="6276" actId="1076"/>
-          <ac:cxnSpMkLst>
-            <pc:docMk/>
-            <pc:sldMk cId="1767245589" sldId="272"/>
-            <ac:cxnSpMk id="26" creationId="{24747122-5B36-739F-9F5D-A25E30C5894E}"/>
-          </ac:cxnSpMkLst>
-        </pc:cxnChg>
-        <pc:cxnChg chg="add mod">
-          <ac:chgData name="François GLEYZON" userId="a2d04f23f7faf3ef" providerId="LiveId" clId="{1404D58C-429C-4D75-B5B2-E1C9B8E0DC36}" dt="2025-03-16T18:08:12.757" v="6293" actId="1076"/>
-          <ac:cxnSpMkLst>
-            <pc:docMk/>
-            <pc:sldMk cId="1767245589" sldId="272"/>
-            <ac:cxnSpMk id="29" creationId="{ED3FFF44-1763-2C72-B7EF-4BAA1E20308F}"/>
-          </ac:cxnSpMkLst>
-        </pc:cxnChg>
-        <pc:cxnChg chg="add mod">
-          <ac:chgData name="François GLEYZON" userId="a2d04f23f7faf3ef" providerId="LiveId" clId="{1404D58C-429C-4D75-B5B2-E1C9B8E0DC36}" dt="2025-03-16T18:08:12.757" v="6293" actId="1076"/>
-          <ac:cxnSpMkLst>
-            <pc:docMk/>
-            <pc:sldMk cId="1767245589" sldId="272"/>
-            <ac:cxnSpMk id="30" creationId="{ED17C5F0-368F-E284-A61A-C3045C6891D1}"/>
-          </ac:cxnSpMkLst>
-        </pc:cxnChg>
-        <pc:cxnChg chg="add mod">
-          <ac:chgData name="François GLEYZON" userId="a2d04f23f7faf3ef" providerId="LiveId" clId="{1404D58C-429C-4D75-B5B2-E1C9B8E0DC36}" dt="2025-03-16T18:08:12.757" v="6293" actId="1076"/>
-          <ac:cxnSpMkLst>
-            <pc:docMk/>
-            <pc:sldMk cId="1767245589" sldId="272"/>
-            <ac:cxnSpMk id="32" creationId="{EBF41D9D-82DF-C3F4-5E79-9F90515FE944}"/>
-          </ac:cxnSpMkLst>
-        </pc:cxnChg>
-        <pc:cxnChg chg="add mod">
-          <ac:chgData name="François GLEYZON" userId="a2d04f23f7faf3ef" providerId="LiveId" clId="{1404D58C-429C-4D75-B5B2-E1C9B8E0DC36}" dt="2025-03-16T18:08:12.757" v="6293" actId="1076"/>
-          <ac:cxnSpMkLst>
-            <pc:docMk/>
-            <pc:sldMk cId="1767245589" sldId="272"/>
-            <ac:cxnSpMk id="33" creationId="{485B08DD-0A2D-7F00-A27D-0359CCD8796F}"/>
-          </ac:cxnSpMkLst>
-        </pc:cxnChg>
-        <pc:cxnChg chg="add mod">
-          <ac:chgData name="François GLEYZON" userId="a2d04f23f7faf3ef" providerId="LiveId" clId="{1404D58C-429C-4D75-B5B2-E1C9B8E0DC36}" dt="2025-03-16T18:08:12.757" v="6293" actId="1076"/>
-          <ac:cxnSpMkLst>
-            <pc:docMk/>
-            <pc:sldMk cId="1767245589" sldId="272"/>
-            <ac:cxnSpMk id="34" creationId="{0B4B6C7C-6463-E2E8-72B3-5CFE5A079E3B}"/>
-          </ac:cxnSpMkLst>
-        </pc:cxnChg>
-        <pc:cxnChg chg="add mod">
-          <ac:chgData name="François GLEYZON" userId="a2d04f23f7faf3ef" providerId="LiveId" clId="{1404D58C-429C-4D75-B5B2-E1C9B8E0DC36}" dt="2025-03-16T18:08:12.757" v="6293" actId="1076"/>
-          <ac:cxnSpMkLst>
-            <pc:docMk/>
-            <pc:sldMk cId="1767245589" sldId="272"/>
-            <ac:cxnSpMk id="35" creationId="{03D955B2-F219-8CB6-1E53-3AA6415D6650}"/>
-          </ac:cxnSpMkLst>
-        </pc:cxnChg>
-        <pc:cxnChg chg="add mod">
-          <ac:chgData name="François GLEYZON" userId="a2d04f23f7faf3ef" providerId="LiveId" clId="{1404D58C-429C-4D75-B5B2-E1C9B8E0DC36}" dt="2025-03-16T18:08:12.757" v="6293" actId="1076"/>
-          <ac:cxnSpMkLst>
-            <pc:docMk/>
-            <pc:sldMk cId="1767245589" sldId="272"/>
-            <ac:cxnSpMk id="37" creationId="{16D7FD71-B1AD-0F14-A6E2-E849307A4B3A}"/>
-          </ac:cxnSpMkLst>
-        </pc:cxnChg>
-        <pc:cxnChg chg="add mod">
-          <ac:chgData name="François GLEYZON" userId="a2d04f23f7faf3ef" providerId="LiveId" clId="{1404D58C-429C-4D75-B5B2-E1C9B8E0DC36}" dt="2025-03-16T18:08:12.757" v="6293" actId="1076"/>
-          <ac:cxnSpMkLst>
-            <pc:docMk/>
-            <pc:sldMk cId="1767245589" sldId="272"/>
-            <ac:cxnSpMk id="38" creationId="{8618A658-E824-26F7-2526-3280361FFBE8}"/>
-          </ac:cxnSpMkLst>
-        </pc:cxnChg>
-        <pc:cxnChg chg="add mod">
-          <ac:chgData name="François GLEYZON" userId="a2d04f23f7faf3ef" providerId="LiveId" clId="{1404D58C-429C-4D75-B5B2-E1C9B8E0DC36}" dt="2025-03-16T18:08:12.757" v="6293" actId="1076"/>
-          <ac:cxnSpMkLst>
-            <pc:docMk/>
-            <pc:sldMk cId="1767245589" sldId="272"/>
-            <ac:cxnSpMk id="40" creationId="{CC554D35-7624-2528-FD55-5AD0D0D02370}"/>
-          </ac:cxnSpMkLst>
-        </pc:cxnChg>
-      </pc:sldChg>
-      <pc:sldChg chg="addSp delSp modSp add mod">
-        <pc:chgData name="François GLEYZON" userId="a2d04f23f7faf3ef" providerId="LiveId" clId="{1404D58C-429C-4D75-B5B2-E1C9B8E0DC36}" dt="2025-03-27T21:10:24.446" v="8858" actId="20577"/>
-        <pc:sldMkLst>
-          <pc:docMk/>
-          <pc:sldMk cId="3992977093" sldId="273"/>
-        </pc:sldMkLst>
-        <pc:spChg chg="add mod">
-          <ac:chgData name="François GLEYZON" userId="a2d04f23f7faf3ef" providerId="LiveId" clId="{1404D58C-429C-4D75-B5B2-E1C9B8E0DC36}" dt="2025-03-16T14:36:45.214" v="1523"/>
-          <ac:spMkLst>
-            <pc:docMk/>
-            <pc:sldMk cId="3992977093" sldId="273"/>
-            <ac:spMk id="2" creationId="{0042AAB7-5C77-4BBB-D2D5-854226AC3ED2}"/>
-          </ac:spMkLst>
-        </pc:spChg>
-        <pc:spChg chg="add mod">
-          <ac:chgData name="François GLEYZON" userId="a2d04f23f7faf3ef" providerId="LiveId" clId="{1404D58C-429C-4D75-B5B2-E1C9B8E0DC36}" dt="2025-03-27T20:58:54.799" v="7856" actId="20577"/>
-          <ac:spMkLst>
-            <pc:docMk/>
-            <pc:sldMk cId="3992977093" sldId="273"/>
-            <ac:spMk id="3" creationId="{E3F04533-03AC-21EF-93FD-83141649C652}"/>
-          </ac:spMkLst>
-        </pc:spChg>
-        <pc:spChg chg="add mod">
-          <ac:chgData name="François GLEYZON" userId="a2d04f23f7faf3ef" providerId="LiveId" clId="{1404D58C-429C-4D75-B5B2-E1C9B8E0DC36}" dt="2025-03-27T20:54:53.533" v="7835" actId="14100"/>
-          <ac:spMkLst>
-            <pc:docMk/>
-            <pc:sldMk cId="3992977093" sldId="273"/>
-            <ac:spMk id="5" creationId="{553BCEC3-A8F4-DAC1-BEC4-21AF39FC432C}"/>
-          </ac:spMkLst>
-        </pc:spChg>
-        <pc:spChg chg="mod">
-          <ac:chgData name="François GLEYZON" userId="a2d04f23f7faf3ef" providerId="LiveId" clId="{1404D58C-429C-4D75-B5B2-E1C9B8E0DC36}" dt="2025-03-16T14:18:10.318" v="137" actId="20577"/>
-          <ac:spMkLst>
-            <pc:docMk/>
-            <pc:sldMk cId="3992977093" sldId="273"/>
-            <ac:spMk id="9" creationId="{C9B5B16C-1DB0-E947-93DF-D6622677A8E5}"/>
-          </ac:spMkLst>
-        </pc:spChg>
-        <pc:spChg chg="add mod">
-          <ac:chgData name="François GLEYZON" userId="a2d04f23f7faf3ef" providerId="LiveId" clId="{1404D58C-429C-4D75-B5B2-E1C9B8E0DC36}" dt="2025-03-27T21:03:57.591" v="8432" actId="20577"/>
-          <ac:spMkLst>
-            <pc:docMk/>
-            <pc:sldMk cId="3992977093" sldId="273"/>
-            <ac:spMk id="13" creationId="{4F92AAEB-8362-34E4-82A1-BF26B6648AA5}"/>
-          </ac:spMkLst>
-        </pc:spChg>
-        <pc:spChg chg="add mod">
-          <ac:chgData name="François GLEYZON" userId="a2d04f23f7faf3ef" providerId="LiveId" clId="{1404D58C-429C-4D75-B5B2-E1C9B8E0DC36}" dt="2025-03-27T21:10:24.446" v="8858" actId="20577"/>
-          <ac:spMkLst>
-            <pc:docMk/>
-            <pc:sldMk cId="3992977093" sldId="273"/>
-            <ac:spMk id="14" creationId="{48BDC8D2-B524-1313-821E-AE3DCCAD58E5}"/>
-          </ac:spMkLst>
-        </pc:spChg>
-        <pc:picChg chg="add mod">
-          <ac:chgData name="François GLEYZON" userId="a2d04f23f7faf3ef" providerId="LiveId" clId="{1404D58C-429C-4D75-B5B2-E1C9B8E0DC36}" dt="2025-03-27T20:54:32.814" v="7811"/>
-          <ac:picMkLst>
-            <pc:docMk/>
-            <pc:sldMk cId="3992977093" sldId="273"/>
-            <ac:picMk id="4" creationId="{91688AE2-5959-A781-FCEA-3219A0B37ED1}"/>
-          </ac:picMkLst>
-        </pc:picChg>
-        <pc:picChg chg="add mod">
-          <ac:chgData name="François GLEYZON" userId="a2d04f23f7faf3ef" providerId="LiveId" clId="{1404D58C-429C-4D75-B5B2-E1C9B8E0DC36}" dt="2025-03-27T20:56:52.069" v="7850" actId="1076"/>
-          <ac:picMkLst>
-            <pc:docMk/>
-            <pc:sldMk cId="3992977093" sldId="273"/>
-            <ac:picMk id="7" creationId="{95DA9114-B9DC-EAA8-3C4C-01EE1B196BB1}"/>
-          </ac:picMkLst>
-        </pc:picChg>
-        <pc:picChg chg="add mod">
-          <ac:chgData name="François GLEYZON" userId="a2d04f23f7faf3ef" providerId="LiveId" clId="{1404D58C-429C-4D75-B5B2-E1C9B8E0DC36}" dt="2025-03-27T20:56:52.069" v="7850" actId="1076"/>
-          <ac:picMkLst>
-            <pc:docMk/>
-            <pc:sldMk cId="3992977093" sldId="273"/>
-            <ac:picMk id="10" creationId="{71B00AE5-45C4-9ACA-101A-43DB73FF576D}"/>
-          </ac:picMkLst>
-        </pc:picChg>
-        <pc:picChg chg="add del mod">
-          <ac:chgData name="François GLEYZON" userId="a2d04f23f7faf3ef" providerId="LiveId" clId="{1404D58C-429C-4D75-B5B2-E1C9B8E0DC36}" dt="2025-03-27T20:56:35.793" v="7847" actId="21"/>
-          <ac:picMkLst>
-            <pc:docMk/>
-            <pc:sldMk cId="3992977093" sldId="273"/>
-            <ac:picMk id="12" creationId="{3E431663-A0A1-F147-8DD1-649B435558AF}"/>
-          </ac:picMkLst>
-        </pc:picChg>
-      </pc:sldChg>
-      <pc:sldChg chg="addSp delSp modSp add mod">
-        <pc:chgData name="François GLEYZON" userId="a2d04f23f7faf3ef" providerId="LiveId" clId="{1404D58C-429C-4D75-B5B2-E1C9B8E0DC36}" dt="2025-03-16T18:23:52.809" v="6936" actId="113"/>
-        <pc:sldMkLst>
-          <pc:docMk/>
-          <pc:sldMk cId="1403034857" sldId="274"/>
-        </pc:sldMkLst>
-        <pc:spChg chg="add mod">
-          <ac:chgData name="François GLEYZON" userId="a2d04f23f7faf3ef" providerId="LiveId" clId="{1404D58C-429C-4D75-B5B2-E1C9B8E0DC36}" dt="2025-03-16T17:42:43.868" v="3939" actId="20577"/>
-          <ac:spMkLst>
-            <pc:docMk/>
-            <pc:sldMk cId="1403034857" sldId="274"/>
-            <ac:spMk id="2" creationId="{250421EB-6552-6AB6-6F25-DA6377842E5D}"/>
-          </ac:spMkLst>
-        </pc:spChg>
-        <pc:spChg chg="add mod">
-          <ac:chgData name="François GLEYZON" userId="a2d04f23f7faf3ef" providerId="LiveId" clId="{1404D58C-429C-4D75-B5B2-E1C9B8E0DC36}" dt="2025-03-16T14:34:27.905" v="1172" actId="20577"/>
-          <ac:spMkLst>
-            <pc:docMk/>
-            <pc:sldMk cId="1403034857" sldId="274"/>
-            <ac:spMk id="4" creationId="{E3C49277-8E12-BB83-3B74-7BE038B51A44}"/>
-          </ac:spMkLst>
-        </pc:spChg>
-        <pc:spChg chg="add mod">
-          <ac:chgData name="François GLEYZON" userId="a2d04f23f7faf3ef" providerId="LiveId" clId="{1404D58C-429C-4D75-B5B2-E1C9B8E0DC36}" dt="2025-03-16T14:36:33.003" v="1517"/>
-          <ac:spMkLst>
-            <pc:docMk/>
-            <pc:sldMk cId="1403034857" sldId="274"/>
-            <ac:spMk id="6" creationId="{47CB0EFF-830F-8349-9DB3-FB9A307C5887}"/>
-          </ac:spMkLst>
-        </pc:spChg>
-        <pc:spChg chg="add mod">
-          <ac:chgData name="François GLEYZON" userId="a2d04f23f7faf3ef" providerId="LiveId" clId="{1404D58C-429C-4D75-B5B2-E1C9B8E0DC36}" dt="2025-03-16T14:41:39.123" v="2068" actId="20577"/>
-          <ac:spMkLst>
-            <pc:docMk/>
-            <pc:sldMk cId="1403034857" sldId="274"/>
-            <ac:spMk id="8" creationId="{23AAE550-8793-C14A-40F5-CD14768E5CC4}"/>
-          </ac:spMkLst>
-        </pc:spChg>
-        <pc:spChg chg="mod">
-          <ac:chgData name="François GLEYZON" userId="a2d04f23f7faf3ef" providerId="LiveId" clId="{1404D58C-429C-4D75-B5B2-E1C9B8E0DC36}" dt="2025-03-16T14:33:28.183" v="1132"/>
-          <ac:spMkLst>
-            <pc:docMk/>
-            <pc:sldMk cId="1403034857" sldId="274"/>
-            <ac:spMk id="11" creationId="{CC039125-0F68-3456-446E-4D9C7474E349}"/>
-          </ac:spMkLst>
-        </pc:spChg>
-        <pc:spChg chg="add mod">
-          <ac:chgData name="François GLEYZON" userId="a2d04f23f7faf3ef" providerId="LiveId" clId="{1404D58C-429C-4D75-B5B2-E1C9B8E0DC36}" dt="2025-03-16T18:23:52.809" v="6936" actId="113"/>
-          <ac:spMkLst>
-            <pc:docMk/>
-            <pc:sldMk cId="1403034857" sldId="274"/>
-            <ac:spMk id="13" creationId="{F42919BC-EA1A-4B98-6077-4001FBC5468F}"/>
-          </ac:spMkLst>
-        </pc:spChg>
-        <pc:picChg chg="add mod">
-          <ac:chgData name="François GLEYZON" userId="a2d04f23f7faf3ef" providerId="LiveId" clId="{1404D58C-429C-4D75-B5B2-E1C9B8E0DC36}" dt="2025-03-16T14:34:09.753" v="1139" actId="1076"/>
-          <ac:picMkLst>
-            <pc:docMk/>
-            <pc:sldMk cId="1403034857" sldId="274"/>
-            <ac:picMk id="3" creationId="{E01AC50A-D99A-D3E4-4BBB-CAE8C1141722}"/>
-          </ac:picMkLst>
-        </pc:picChg>
-        <pc:picChg chg="add mod">
-          <ac:chgData name="François GLEYZON" userId="a2d04f23f7faf3ef" providerId="LiveId" clId="{1404D58C-429C-4D75-B5B2-E1C9B8E0DC36}" dt="2025-03-16T14:41:10.123" v="2055" actId="1076"/>
-          <ac:picMkLst>
-            <pc:docMk/>
-            <pc:sldMk cId="1403034857" sldId="274"/>
-            <ac:picMk id="14" creationId="{6D57DE72-C86C-8864-4204-0A2213B42D38}"/>
-          </ac:picMkLst>
-        </pc:picChg>
-        <pc:picChg chg="add mod">
-          <ac:chgData name="François GLEYZON" userId="a2d04f23f7faf3ef" providerId="LiveId" clId="{1404D58C-429C-4D75-B5B2-E1C9B8E0DC36}" dt="2025-03-16T17:43:16.898" v="3942" actId="1076"/>
-          <ac:picMkLst>
-            <pc:docMk/>
-            <pc:sldMk cId="1403034857" sldId="274"/>
-            <ac:picMk id="1026" creationId="{C8CA877A-7DDE-FEB7-24D0-9EE0DFAC3ACC}"/>
-          </ac:picMkLst>
-        </pc:picChg>
-      </pc:sldChg>
-      <pc:sldChg chg="addSp delSp modSp add mod">
-        <pc:chgData name="François GLEYZON" userId="a2d04f23f7faf3ef" providerId="LiveId" clId="{1404D58C-429C-4D75-B5B2-E1C9B8E0DC36}" dt="2025-03-16T18:27:24.448" v="7125" actId="114"/>
-        <pc:sldMkLst>
-          <pc:docMk/>
-          <pc:sldMk cId="3135963873" sldId="275"/>
-        </pc:sldMkLst>
-        <pc:spChg chg="add mod">
-          <ac:chgData name="François GLEYZON" userId="a2d04f23f7faf3ef" providerId="LiveId" clId="{1404D58C-429C-4D75-B5B2-E1C9B8E0DC36}" dt="2025-03-16T18:27:24.448" v="7125" actId="114"/>
-          <ac:spMkLst>
-            <pc:docMk/>
-            <pc:sldMk cId="3135963873" sldId="275"/>
-            <ac:spMk id="5" creationId="{FAC551E2-7AD3-5FEF-E2DE-209EDBFB2695}"/>
-          </ac:spMkLst>
-        </pc:spChg>
-        <pc:spChg chg="mod">
-          <ac:chgData name="François GLEYZON" userId="a2d04f23f7faf3ef" providerId="LiveId" clId="{1404D58C-429C-4D75-B5B2-E1C9B8E0DC36}" dt="2025-03-16T15:23:02.888" v="3258" actId="20577"/>
-          <ac:spMkLst>
-            <pc:docMk/>
-            <pc:sldMk cId="3135963873" sldId="275"/>
-            <ac:spMk id="9" creationId="{A1BFB0DE-CCDE-5E15-B93D-0C46D50CF46E}"/>
-          </ac:spMkLst>
-        </pc:spChg>
-      </pc:sldChg>
-      <pc:sldChg chg="addSp delSp modSp add mod">
-        <pc:chgData name="François GLEYZON" userId="a2d04f23f7faf3ef" providerId="LiveId" clId="{1404D58C-429C-4D75-B5B2-E1C9B8E0DC36}" dt="2025-03-27T20:54:15.974" v="7809" actId="1037"/>
-        <pc:sldMkLst>
-          <pc:docMk/>
-          <pc:sldMk cId="312469821" sldId="276"/>
-        </pc:sldMkLst>
-        <pc:spChg chg="add mod">
-          <ac:chgData name="François GLEYZON" userId="a2d04f23f7faf3ef" providerId="LiveId" clId="{1404D58C-429C-4D75-B5B2-E1C9B8E0DC36}" dt="2025-03-27T20:54:15.974" v="7809" actId="1037"/>
-          <ac:spMkLst>
-            <pc:docMk/>
-            <pc:sldMk cId="312469821" sldId="276"/>
-            <ac:spMk id="3" creationId="{1E469B70-0A01-2F0B-8630-A75E636CB8E6}"/>
-          </ac:spMkLst>
-        </pc:spChg>
-        <pc:spChg chg="mod">
-          <ac:chgData name="François GLEYZON" userId="a2d04f23f7faf3ef" providerId="LiveId" clId="{1404D58C-429C-4D75-B5B2-E1C9B8E0DC36}" dt="2025-03-16T17:45:37.898" v="4201" actId="33524"/>
-          <ac:spMkLst>
-            <pc:docMk/>
-            <pc:sldMk cId="312469821" sldId="276"/>
-            <ac:spMk id="5" creationId="{D2931CAA-5B1D-3DB8-5405-0EBED6E73DDA}"/>
-          </ac:spMkLst>
-        </pc:spChg>
-        <pc:spChg chg="add mod">
-          <ac:chgData name="François GLEYZON" userId="a2d04f23f7faf3ef" providerId="LiveId" clId="{1404D58C-429C-4D75-B5B2-E1C9B8E0DC36}" dt="2025-03-16T17:58:26.908" v="5884" actId="13926"/>
-          <ac:spMkLst>
-            <pc:docMk/>
-            <pc:sldMk cId="312469821" sldId="276"/>
-            <ac:spMk id="8" creationId="{A3FB3464-F9D7-F388-8CA4-20C652C808AB}"/>
-          </ac:spMkLst>
-        </pc:spChg>
-        <pc:spChg chg="add mod">
-          <ac:chgData name="François GLEYZON" userId="a2d04f23f7faf3ef" providerId="LiveId" clId="{1404D58C-429C-4D75-B5B2-E1C9B8E0DC36}" dt="2025-03-16T18:24:53.792" v="6937" actId="1076"/>
-          <ac:spMkLst>
-            <pc:docMk/>
-            <pc:sldMk cId="312469821" sldId="276"/>
-            <ac:spMk id="10" creationId="{3787056C-9D45-21F4-6CDE-BB39E364A145}"/>
-          </ac:spMkLst>
-        </pc:spChg>
-        <pc:spChg chg="add mod">
-          <ac:chgData name="François GLEYZON" userId="a2d04f23f7faf3ef" providerId="LiveId" clId="{1404D58C-429C-4D75-B5B2-E1C9B8E0DC36}" dt="2025-03-16T18:25:24.592" v="6981" actId="114"/>
-          <ac:spMkLst>
-            <pc:docMk/>
-            <pc:sldMk cId="312469821" sldId="276"/>
-            <ac:spMk id="11" creationId="{9D58840C-50FD-E58B-670F-C4615DAF690D}"/>
-          </ac:spMkLst>
-        </pc:spChg>
-        <pc:picChg chg="add mod">
-          <ac:chgData name="François GLEYZON" userId="a2d04f23f7faf3ef" providerId="LiveId" clId="{1404D58C-429C-4D75-B5B2-E1C9B8E0DC36}" dt="2025-03-16T17:49:26.117" v="4766" actId="1076"/>
-          <ac:picMkLst>
-            <pc:docMk/>
-            <pc:sldMk cId="312469821" sldId="276"/>
-            <ac:picMk id="7" creationId="{4C33A69A-4ABB-390F-8D1C-5D58AB9AF2C3}"/>
-          </ac:picMkLst>
-        </pc:picChg>
-        <pc:picChg chg="add mod">
-          <ac:chgData name="François GLEYZON" userId="a2d04f23f7faf3ef" providerId="LiveId" clId="{1404D58C-429C-4D75-B5B2-E1C9B8E0DC36}" dt="2025-03-27T20:54:15.974" v="7809" actId="1037"/>
-          <ac:picMkLst>
-            <pc:docMk/>
-            <pc:sldMk cId="312469821" sldId="276"/>
-            <ac:picMk id="2050" creationId="{C26E7882-1A4B-4D9E-20C6-8D0DCC3535F1}"/>
-          </ac:picMkLst>
-        </pc:picChg>
-      </pc:sldChg>
-      <pc:sldChg chg="addSp delSp modSp add mod">
-        <pc:chgData name="François GLEYZON" userId="a2d04f23f7faf3ef" providerId="LiveId" clId="{1404D58C-429C-4D75-B5B2-E1C9B8E0DC36}" dt="2025-03-27T20:54:22.304" v="7810"/>
-        <pc:sldMkLst>
-          <pc:docMk/>
-          <pc:sldMk cId="1989661597" sldId="277"/>
-        </pc:sldMkLst>
-        <pc:spChg chg="add mod">
-          <ac:chgData name="François GLEYZON" userId="a2d04f23f7faf3ef" providerId="LiveId" clId="{1404D58C-429C-4D75-B5B2-E1C9B8E0DC36}" dt="2025-03-27T20:54:22.304" v="7810"/>
-          <ac:spMkLst>
-            <pc:docMk/>
-            <pc:sldMk cId="1989661597" sldId="277"/>
-            <ac:spMk id="4" creationId="{75AA8A51-2A97-8D06-CECD-B9BDC2716E90}"/>
-          </ac:spMkLst>
-        </pc:spChg>
-        <pc:spChg chg="mod">
-          <ac:chgData name="François GLEYZON" userId="a2d04f23f7faf3ef" providerId="LiveId" clId="{1404D58C-429C-4D75-B5B2-E1C9B8E0DC36}" dt="2025-03-16T18:25:42.620" v="6987" actId="6549"/>
-          <ac:spMkLst>
-            <pc:docMk/>
-            <pc:sldMk cId="1989661597" sldId="277"/>
-            <ac:spMk id="5" creationId="{4DAC8AF4-A004-7163-A739-49ECA39B9FEC}"/>
-          </ac:spMkLst>
-        </pc:spChg>
-        <pc:spChg chg="mod">
-          <ac:chgData name="François GLEYZON" userId="a2d04f23f7faf3ef" providerId="LiveId" clId="{1404D58C-429C-4D75-B5B2-E1C9B8E0DC36}" dt="2025-03-16T18:25:46.907" v="6988" actId="1076"/>
-          <ac:spMkLst>
-            <pc:docMk/>
-            <pc:sldMk cId="1989661597" sldId="277"/>
-            <ac:spMk id="10" creationId="{01A678EA-30F3-62CE-A9F0-10C182D4BBB2}"/>
-          </ac:spMkLst>
-        </pc:spChg>
-        <pc:spChg chg="add mod">
-          <ac:chgData name="François GLEYZON" userId="a2d04f23f7faf3ef" providerId="LiveId" clId="{1404D58C-429C-4D75-B5B2-E1C9B8E0DC36}" dt="2025-03-16T18:25:55.029" v="6991" actId="1076"/>
-          <ac:spMkLst>
-            <pc:docMk/>
-            <pc:sldMk cId="1989661597" sldId="277"/>
-            <ac:spMk id="12" creationId="{AFD64144-DA5F-8B73-6CEA-181D47AD5646}"/>
-          </ac:spMkLst>
-        </pc:spChg>
-        <pc:spChg chg="add mod">
-          <ac:chgData name="François GLEYZON" userId="a2d04f23f7faf3ef" providerId="LiveId" clId="{1404D58C-429C-4D75-B5B2-E1C9B8E0DC36}" dt="2025-03-16T18:25:52.377" v="6990" actId="1076"/>
-          <ac:spMkLst>
-            <pc:docMk/>
-            <pc:sldMk cId="1989661597" sldId="277"/>
-            <ac:spMk id="13" creationId="{C4557F9C-855D-3055-9D46-7013C9868120}"/>
-          </ac:spMkLst>
-        </pc:spChg>
-        <pc:picChg chg="add mod">
-          <ac:chgData name="François GLEYZON" userId="a2d04f23f7faf3ef" providerId="LiveId" clId="{1404D58C-429C-4D75-B5B2-E1C9B8E0DC36}" dt="2025-03-27T20:54:22.304" v="7810"/>
-          <ac:picMkLst>
-            <pc:docMk/>
-            <pc:sldMk cId="1989661597" sldId="277"/>
-            <ac:picMk id="3" creationId="{9418A06D-5188-6FDC-24BC-F87439036057}"/>
-          </ac:picMkLst>
-        </pc:picChg>
-        <pc:picChg chg="add mod">
-          <ac:chgData name="François GLEYZON" userId="a2d04f23f7faf3ef" providerId="LiveId" clId="{1404D58C-429C-4D75-B5B2-E1C9B8E0DC36}" dt="2025-03-16T18:25:48.590" v="6989" actId="1076"/>
-          <ac:picMkLst>
-            <pc:docMk/>
-            <pc:sldMk cId="1989661597" sldId="277"/>
-            <ac:picMk id="11" creationId="{76E36435-5B32-C3F8-CDBC-02E2B5086320}"/>
-          </ac:picMkLst>
-        </pc:picChg>
-      </pc:sldChg>
-      <pc:sldChg chg="addSp delSp modSp add mod">
-        <pc:chgData name="François GLEYZON" userId="a2d04f23f7faf3ef" providerId="LiveId" clId="{1404D58C-429C-4D75-B5B2-E1C9B8E0DC36}" dt="2025-03-18T00:13:16.107" v="7136" actId="13926"/>
-        <pc:sldMkLst>
-          <pc:docMk/>
-          <pc:sldMk cId="3353157011" sldId="278"/>
-        </pc:sldMkLst>
-        <pc:spChg chg="add mod">
-          <ac:chgData name="François GLEYZON" userId="a2d04f23f7faf3ef" providerId="LiveId" clId="{1404D58C-429C-4D75-B5B2-E1C9B8E0DC36}" dt="2025-03-16T18:20:16.267" v="6837" actId="207"/>
-          <ac:spMkLst>
-            <pc:docMk/>
-            <pc:sldMk cId="3353157011" sldId="278"/>
-            <ac:spMk id="3" creationId="{9B7F5462-4ABB-EBA2-0610-D1DC1488F1E8}"/>
-          </ac:spMkLst>
-        </pc:spChg>
-        <pc:spChg chg="add mod">
-          <ac:chgData name="François GLEYZON" userId="a2d04f23f7faf3ef" providerId="LiveId" clId="{1404D58C-429C-4D75-B5B2-E1C9B8E0DC36}" dt="2025-03-16T18:22:57.632" v="6908" actId="13926"/>
-          <ac:spMkLst>
-            <pc:docMk/>
-            <pc:sldMk cId="3353157011" sldId="278"/>
-            <ac:spMk id="4" creationId="{071085C4-0B93-7C4D-668E-440636B813C4}"/>
-          </ac:spMkLst>
-        </pc:spChg>
-        <pc:spChg chg="mod">
-          <ac:chgData name="François GLEYZON" userId="a2d04f23f7faf3ef" providerId="LiveId" clId="{1404D58C-429C-4D75-B5B2-E1C9B8E0DC36}" dt="2025-03-18T00:13:16.107" v="7136" actId="13926"/>
-          <ac:spMkLst>
-            <pc:docMk/>
-            <pc:sldMk cId="3353157011" sldId="278"/>
-            <ac:spMk id="5" creationId="{123C1752-9749-D963-C34A-A3CB069DD9C5}"/>
-          </ac:spMkLst>
-        </pc:spChg>
-      </pc:sldChg>
-      <pc:sldChg chg="add">
-        <pc:chgData name="François GLEYZON" userId="a2d04f23f7faf3ef" providerId="LiveId" clId="{1404D58C-429C-4D75-B5B2-E1C9B8E0DC36}" dt="2025-03-27T15:48:09.571" v="7435"/>
-        <pc:sldMkLst>
-          <pc:docMk/>
-          <pc:sldMk cId="963883029" sldId="279"/>
-        </pc:sldMkLst>
-      </pc:sldChg>
-      <pc:sldChg chg="addSp delSp modSp add mod">
-        <pc:chgData name="François GLEYZON" userId="a2d04f23f7faf3ef" providerId="LiveId" clId="{1404D58C-429C-4D75-B5B2-E1C9B8E0DC36}" dt="2025-03-27T21:12:56.884" v="8997" actId="20577"/>
-        <pc:sldMkLst>
-          <pc:docMk/>
-          <pc:sldMk cId="956691911" sldId="280"/>
-        </pc:sldMkLst>
-        <pc:spChg chg="mod">
-          <ac:chgData name="François GLEYZON" userId="a2d04f23f7faf3ef" providerId="LiveId" clId="{1404D58C-429C-4D75-B5B2-E1C9B8E0DC36}" dt="2025-03-27T21:06:48.929" v="8549" actId="114"/>
-          <ac:spMkLst>
-            <pc:docMk/>
-            <pc:sldMk cId="956691911" sldId="280"/>
-            <ac:spMk id="3" creationId="{49E817FD-6192-C972-9162-7F57B3CE3D00}"/>
-          </ac:spMkLst>
-        </pc:spChg>
-        <pc:spChg chg="del">
-          <ac:chgData name="François GLEYZON" userId="a2d04f23f7faf3ef" providerId="LiveId" clId="{1404D58C-429C-4D75-B5B2-E1C9B8E0DC36}" dt="2025-03-27T21:05:37.824" v="8495" actId="478"/>
-          <ac:spMkLst>
-            <pc:docMk/>
-            <pc:sldMk cId="956691911" sldId="280"/>
-            <ac:spMk id="13" creationId="{30FD23D6-F439-5EE3-0133-24669F1EF0A4}"/>
-          </ac:spMkLst>
-        </pc:spChg>
-        <pc:spChg chg="add mod">
-          <ac:chgData name="François GLEYZON" userId="a2d04f23f7faf3ef" providerId="LiveId" clId="{1404D58C-429C-4D75-B5B2-E1C9B8E0DC36}" dt="2025-03-27T21:12:56.884" v="8997" actId="20577"/>
-          <ac:spMkLst>
-            <pc:docMk/>
-            <pc:sldMk cId="956691911" sldId="280"/>
-            <ac:spMk id="14" creationId="{15BE0636-0290-4D62-2BBD-81087B277E96}"/>
-          </ac:spMkLst>
-        </pc:spChg>
-        <pc:spChg chg="add del mod">
-          <ac:chgData name="François GLEYZON" userId="a2d04f23f7faf3ef" providerId="LiveId" clId="{1404D58C-429C-4D75-B5B2-E1C9B8E0DC36}" dt="2025-03-27T21:11:48.167" v="8891" actId="478"/>
-          <ac:spMkLst>
-            <pc:docMk/>
-            <pc:sldMk cId="956691911" sldId="280"/>
-            <ac:spMk id="16" creationId="{DF78B8ED-CA81-7442-722A-9100B46FFC0F}"/>
-          </ac:spMkLst>
-        </pc:spChg>
-        <pc:spChg chg="add del mod">
-          <ac:chgData name="François GLEYZON" userId="a2d04f23f7faf3ef" providerId="LiveId" clId="{1404D58C-429C-4D75-B5B2-E1C9B8E0DC36}" dt="2025-03-27T21:11:00.101" v="8865"/>
-          <ac:spMkLst>
-            <pc:docMk/>
-            <pc:sldMk cId="956691911" sldId="280"/>
-            <ac:spMk id="17" creationId="{DA909163-8B12-2698-D0BA-A5A3E3CFC4D8}"/>
-          </ac:spMkLst>
-        </pc:spChg>
-        <pc:spChg chg="add mod">
-          <ac:chgData name="François GLEYZON" userId="a2d04f23f7faf3ef" providerId="LiveId" clId="{1404D58C-429C-4D75-B5B2-E1C9B8E0DC36}" dt="2025-03-27T21:12:00.599" v="8896" actId="1036"/>
-          <ac:spMkLst>
-            <pc:docMk/>
-            <pc:sldMk cId="956691911" sldId="280"/>
-            <ac:spMk id="18" creationId="{0B9EC4DF-BFB4-7E6C-E9F3-26663D2EEE7E}"/>
-          </ac:spMkLst>
-        </pc:spChg>
-        <pc:picChg chg="del">
-          <ac:chgData name="François GLEYZON" userId="a2d04f23f7faf3ef" providerId="LiveId" clId="{1404D58C-429C-4D75-B5B2-E1C9B8E0DC36}" dt="2025-03-27T21:05:35.780" v="8493" actId="478"/>
-          <ac:picMkLst>
-            <pc:docMk/>
-            <pc:sldMk cId="956691911" sldId="280"/>
-            <ac:picMk id="7" creationId="{D6A04802-FD94-CCF6-E27E-B6CC2EE0B512}"/>
-          </ac:picMkLst>
-        </pc:picChg>
-        <pc:picChg chg="add mod">
-          <ac:chgData name="François GLEYZON" userId="a2d04f23f7faf3ef" providerId="LiveId" clId="{1404D58C-429C-4D75-B5B2-E1C9B8E0DC36}" dt="2025-03-27T21:11:50.374" v="8893" actId="1076"/>
-          <ac:picMkLst>
-            <pc:docMk/>
-            <pc:sldMk cId="956691911" sldId="280"/>
-            <ac:picMk id="8" creationId="{443D6940-4B4A-542A-BA6C-963F392DDFE4}"/>
-          </ac:picMkLst>
-        </pc:picChg>
-        <pc:picChg chg="del">
-          <ac:chgData name="François GLEYZON" userId="a2d04f23f7faf3ef" providerId="LiveId" clId="{1404D58C-429C-4D75-B5B2-E1C9B8E0DC36}" dt="2025-03-27T21:05:36.341" v="8494" actId="478"/>
-          <ac:picMkLst>
-            <pc:docMk/>
-            <pc:sldMk cId="956691911" sldId="280"/>
-            <ac:picMk id="10" creationId="{8570CB32-03D9-F400-9EEA-BD3656F09699}"/>
-          </ac:picMkLst>
-        </pc:picChg>
-        <pc:picChg chg="add mod">
-          <ac:chgData name="François GLEYZON" userId="a2d04f23f7faf3ef" providerId="LiveId" clId="{1404D58C-429C-4D75-B5B2-E1C9B8E0DC36}" dt="2025-03-27T21:06:13.652" v="8508" actId="1076"/>
-          <ac:picMkLst>
-            <pc:docMk/>
-            <pc:sldMk cId="956691911" sldId="280"/>
-            <ac:picMk id="12" creationId="{5FD27660-F829-9650-A7F7-56552FB1EB07}"/>
-          </ac:picMkLst>
-        </pc:picChg>
-      </pc:sldChg>
-    </pc:docChg>
-  </pc:docChgLst>
   <pc:docChgLst>
     <pc:chgData name="François GLEYZON" userId="a2d04f23f7faf3ef" providerId="LiveId" clId="{8625411A-B743-4065-8137-36E899DC5753}"/>
     <pc:docChg chg="undo custSel addSld delSld modSld">
@@ -2390,6 +1382,1061 @@
       </pc:sldChg>
     </pc:docChg>
   </pc:docChgLst>
+  <pc:docChgLst>
+    <pc:chgData name="François GLEYZON" userId="a2d04f23f7faf3ef" providerId="LiveId" clId="{1404D58C-429C-4D75-B5B2-E1C9B8E0DC36}"/>
+    <pc:docChg chg="undo redo custSel addSld modSld sldOrd">
+      <pc:chgData name="François GLEYZON" userId="a2d04f23f7faf3ef" providerId="LiveId" clId="{1404D58C-429C-4D75-B5B2-E1C9B8E0DC36}" dt="2025-03-28T20:40:04.072" v="9111" actId="20577"/>
+      <pc:docMkLst>
+        <pc:docMk/>
+      </pc:docMkLst>
+      <pc:sldChg chg="addSp delSp modSp mod">
+        <pc:chgData name="François GLEYZON" userId="a2d04f23f7faf3ef" providerId="LiveId" clId="{1404D58C-429C-4D75-B5B2-E1C9B8E0DC36}" dt="2025-03-27T15:44:38.844" v="7178" actId="113"/>
+        <pc:sldMkLst>
+          <pc:docMk/>
+          <pc:sldMk cId="2801290844" sldId="256"/>
+        </pc:sldMkLst>
+        <pc:spChg chg="mod">
+          <ac:chgData name="François GLEYZON" userId="a2d04f23f7faf3ef" providerId="LiveId" clId="{1404D58C-429C-4D75-B5B2-E1C9B8E0DC36}" dt="2025-03-27T15:44:38.844" v="7178" actId="113"/>
+          <ac:spMkLst>
+            <pc:docMk/>
+            <pc:sldMk cId="2801290844" sldId="256"/>
+            <ac:spMk id="5" creationId="{CCB64622-7D99-EF9C-E64A-6B7A68B130E7}"/>
+          </ac:spMkLst>
+        </pc:spChg>
+        <pc:spChg chg="mod">
+          <ac:chgData name="François GLEYZON" userId="a2d04f23f7faf3ef" providerId="LiveId" clId="{1404D58C-429C-4D75-B5B2-E1C9B8E0DC36}" dt="2025-03-27T15:44:33.534" v="7177" actId="1035"/>
+          <ac:spMkLst>
+            <pc:docMk/>
+            <pc:sldMk cId="2801290844" sldId="256"/>
+            <ac:spMk id="11" creationId="{ADA3B4ED-F9F9-8357-018A-C931A9829ED9}"/>
+          </ac:spMkLst>
+        </pc:spChg>
+        <pc:spChg chg="add mod">
+          <ac:chgData name="François GLEYZON" userId="a2d04f23f7faf3ef" providerId="LiveId" clId="{1404D58C-429C-4D75-B5B2-E1C9B8E0DC36}" dt="2025-03-16T14:36:30.969" v="1516"/>
+          <ac:spMkLst>
+            <pc:docMk/>
+            <pc:sldMk cId="2801290844" sldId="256"/>
+            <ac:spMk id="12" creationId="{B3FBCD95-757E-0D30-1DE3-8FB709355D99}"/>
+          </ac:spMkLst>
+        </pc:spChg>
+        <pc:spChg chg="mod">
+          <ac:chgData name="François GLEYZON" userId="a2d04f23f7faf3ef" providerId="LiveId" clId="{1404D58C-429C-4D75-B5B2-E1C9B8E0DC36}" dt="2025-03-27T15:44:33.534" v="7177" actId="1035"/>
+          <ac:spMkLst>
+            <pc:docMk/>
+            <pc:sldMk cId="2801290844" sldId="256"/>
+            <ac:spMk id="13" creationId="{2A150A6C-B8B3-44CE-8884-B81C5AD95D13}"/>
+          </ac:spMkLst>
+        </pc:spChg>
+      </pc:sldChg>
+      <pc:sldChg chg="addSp delSp mod">
+        <pc:chgData name="François GLEYZON" userId="a2d04f23f7faf3ef" providerId="LiveId" clId="{1404D58C-429C-4D75-B5B2-E1C9B8E0DC36}" dt="2025-03-16T14:16:57.551" v="36" actId="22"/>
+        <pc:sldMkLst>
+          <pc:docMk/>
+          <pc:sldMk cId="2487955664" sldId="257"/>
+        </pc:sldMkLst>
+      </pc:sldChg>
+      <pc:sldChg chg="addSp delSp modSp mod">
+        <pc:chgData name="François GLEYZON" userId="a2d04f23f7faf3ef" providerId="LiveId" clId="{1404D58C-429C-4D75-B5B2-E1C9B8E0DC36}" dt="2025-03-16T18:23:45.777" v="6935" actId="20577"/>
+        <pc:sldMkLst>
+          <pc:docMk/>
+          <pc:sldMk cId="1966793551" sldId="265"/>
+        </pc:sldMkLst>
+        <pc:spChg chg="mod">
+          <ac:chgData name="François GLEYZON" userId="a2d04f23f7faf3ef" providerId="LiveId" clId="{1404D58C-429C-4D75-B5B2-E1C9B8E0DC36}" dt="2025-03-16T14:17:32.286" v="61" actId="20577"/>
+          <ac:spMkLst>
+            <pc:docMk/>
+            <pc:sldMk cId="1966793551" sldId="265"/>
+            <ac:spMk id="9" creationId="{6E9846D3-47A3-2AE6-6383-AB77CC5B517E}"/>
+          </ac:spMkLst>
+        </pc:spChg>
+        <pc:spChg chg="add mod">
+          <ac:chgData name="François GLEYZON" userId="a2d04f23f7faf3ef" providerId="LiveId" clId="{1404D58C-429C-4D75-B5B2-E1C9B8E0DC36}" dt="2025-03-16T14:24:23.045" v="574" actId="20577"/>
+          <ac:spMkLst>
+            <pc:docMk/>
+            <pc:sldMk cId="1966793551" sldId="265"/>
+            <ac:spMk id="11" creationId="{072A0C86-E46F-7872-4F73-D0C64405F9A7}"/>
+          </ac:spMkLst>
+        </pc:spChg>
+        <pc:spChg chg="add mod">
+          <ac:chgData name="François GLEYZON" userId="a2d04f23f7faf3ef" providerId="LiveId" clId="{1404D58C-429C-4D75-B5B2-E1C9B8E0DC36}" dt="2025-03-16T18:23:45.777" v="6935" actId="20577"/>
+          <ac:spMkLst>
+            <pc:docMk/>
+            <pc:sldMk cId="1966793551" sldId="265"/>
+            <ac:spMk id="28" creationId="{A3F4CAB7-21CC-3B13-8827-56C233CE43A0}"/>
+          </ac:spMkLst>
+        </pc:spChg>
+        <pc:spChg chg="add mod">
+          <ac:chgData name="François GLEYZON" userId="a2d04f23f7faf3ef" providerId="LiveId" clId="{1404D58C-429C-4D75-B5B2-E1C9B8E0DC36}" dt="2025-03-16T14:28:50.048" v="782" actId="14100"/>
+          <ac:spMkLst>
+            <pc:docMk/>
+            <pc:sldMk cId="1966793551" sldId="265"/>
+            <ac:spMk id="29" creationId="{16F0C38C-ADF0-05C8-AB97-6D861D171C8A}"/>
+          </ac:spMkLst>
+        </pc:spChg>
+        <pc:spChg chg="add mod">
+          <ac:chgData name="François GLEYZON" userId="a2d04f23f7faf3ef" providerId="LiveId" clId="{1404D58C-429C-4D75-B5B2-E1C9B8E0DC36}" dt="2025-03-16T14:37:03.623" v="1524" actId="164"/>
+          <ac:spMkLst>
+            <pc:docMk/>
+            <pc:sldMk cId="1966793551" sldId="265"/>
+            <ac:spMk id="30" creationId="{F9012EBE-327E-81BA-D0CC-DFFC3A81D06E}"/>
+          </ac:spMkLst>
+        </pc:spChg>
+        <pc:spChg chg="add mod">
+          <ac:chgData name="François GLEYZON" userId="a2d04f23f7faf3ef" providerId="LiveId" clId="{1404D58C-429C-4D75-B5B2-E1C9B8E0DC36}" dt="2025-03-16T14:37:03.623" v="1524" actId="164"/>
+          <ac:spMkLst>
+            <pc:docMk/>
+            <pc:sldMk cId="1966793551" sldId="265"/>
+            <ac:spMk id="31" creationId="{E096CA17-3B37-1EC9-086C-6073F9F0E327}"/>
+          </ac:spMkLst>
+        </pc:spChg>
+        <pc:spChg chg="add mod">
+          <ac:chgData name="François GLEYZON" userId="a2d04f23f7faf3ef" providerId="LiveId" clId="{1404D58C-429C-4D75-B5B2-E1C9B8E0DC36}" dt="2025-03-16T14:36:12.133" v="1510" actId="20577"/>
+          <ac:spMkLst>
+            <pc:docMk/>
+            <pc:sldMk cId="1966793551" sldId="265"/>
+            <ac:spMk id="48" creationId="{4BF5205A-C21B-DC10-00D1-30EE1B56E60B}"/>
+          </ac:spMkLst>
+        </pc:spChg>
+        <pc:spChg chg="add mod">
+          <ac:chgData name="François GLEYZON" userId="a2d04f23f7faf3ef" providerId="LiveId" clId="{1404D58C-429C-4D75-B5B2-E1C9B8E0DC36}" dt="2025-03-16T14:36:25.253" v="1514" actId="20577"/>
+          <ac:spMkLst>
+            <pc:docMk/>
+            <pc:sldMk cId="1966793551" sldId="265"/>
+            <ac:spMk id="49" creationId="{A79242B3-F8EA-94FD-D9D9-2D85B18818DC}"/>
+          </ac:spMkLst>
+        </pc:spChg>
+        <pc:grpChg chg="add mod">
+          <ac:chgData name="François GLEYZON" userId="a2d04f23f7faf3ef" providerId="LiveId" clId="{1404D58C-429C-4D75-B5B2-E1C9B8E0DC36}" dt="2025-03-16T14:37:08.843" v="1548" actId="1038"/>
+          <ac:grpSpMkLst>
+            <pc:docMk/>
+            <pc:sldMk cId="1966793551" sldId="265"/>
+            <ac:grpSpMk id="50" creationId="{6D300C5F-060B-A29B-5E63-8AB2F8289D3E}"/>
+          </ac:grpSpMkLst>
+        </pc:grpChg>
+        <pc:picChg chg="add mod">
+          <ac:chgData name="François GLEYZON" userId="a2d04f23f7faf3ef" providerId="LiveId" clId="{1404D58C-429C-4D75-B5B2-E1C9B8E0DC36}" dt="2025-03-16T14:37:03.623" v="1524" actId="164"/>
+          <ac:picMkLst>
+            <pc:docMk/>
+            <pc:sldMk cId="1966793551" sldId="265"/>
+            <ac:picMk id="16" creationId="{C8511678-E88F-7D51-904A-00D5D2E20854}"/>
+          </ac:picMkLst>
+        </pc:picChg>
+        <pc:picChg chg="add mod">
+          <ac:chgData name="François GLEYZON" userId="a2d04f23f7faf3ef" providerId="LiveId" clId="{1404D58C-429C-4D75-B5B2-E1C9B8E0DC36}" dt="2025-03-16T14:37:03.623" v="1524" actId="164"/>
+          <ac:picMkLst>
+            <pc:docMk/>
+            <pc:sldMk cId="1966793551" sldId="265"/>
+            <ac:picMk id="22" creationId="{E271FBCE-EB1D-54CC-CAFB-7E1DFF99CA2E}"/>
+          </ac:picMkLst>
+        </pc:picChg>
+      </pc:sldChg>
+      <pc:sldChg chg="add ord">
+        <pc:chgData name="François GLEYZON" userId="a2d04f23f7faf3ef" providerId="LiveId" clId="{1404D58C-429C-4D75-B5B2-E1C9B8E0DC36}" dt="2025-03-16T14:17:18.713" v="44"/>
+        <pc:sldMkLst>
+          <pc:docMk/>
+          <pc:sldMk cId="3204585435" sldId="267"/>
+        </pc:sldMkLst>
+      </pc:sldChg>
+      <pc:sldChg chg="addSp modSp new mod">
+        <pc:chgData name="François GLEYZON" userId="a2d04f23f7faf3ef" providerId="LiveId" clId="{1404D58C-429C-4D75-B5B2-E1C9B8E0DC36}" dt="2025-03-16T14:17:16.283" v="42" actId="207"/>
+        <pc:sldMkLst>
+          <pc:docMk/>
+          <pc:sldMk cId="1821676052" sldId="268"/>
+        </pc:sldMkLst>
+        <pc:spChg chg="add mod">
+          <ac:chgData name="François GLEYZON" userId="a2d04f23f7faf3ef" providerId="LiveId" clId="{1404D58C-429C-4D75-B5B2-E1C9B8E0DC36}" dt="2025-03-16T14:17:16.283" v="42" actId="207"/>
+          <ac:spMkLst>
+            <pc:docMk/>
+            <pc:sldMk cId="1821676052" sldId="268"/>
+            <ac:spMk id="2" creationId="{CE60E174-1138-FE64-FEE9-6D62A3AC6AD5}"/>
+          </ac:spMkLst>
+        </pc:spChg>
+      </pc:sldChg>
+      <pc:sldChg chg="addSp modSp add mod">
+        <pc:chgData name="François GLEYZON" userId="a2d04f23f7faf3ef" providerId="LiveId" clId="{1404D58C-429C-4D75-B5B2-E1C9B8E0DC36}" dt="2025-03-27T15:47:44.026" v="7434" actId="1037"/>
+        <pc:sldMkLst>
+          <pc:docMk/>
+          <pc:sldMk cId="2830059827" sldId="269"/>
+        </pc:sldMkLst>
+        <pc:spChg chg="add mod">
+          <ac:chgData name="François GLEYZON" userId="a2d04f23f7faf3ef" providerId="LiveId" clId="{1404D58C-429C-4D75-B5B2-E1C9B8E0DC36}" dt="2025-03-16T14:36:36.203" v="1519"/>
+          <ac:spMkLst>
+            <pc:docMk/>
+            <pc:sldMk cId="2830059827" sldId="269"/>
+            <ac:spMk id="2" creationId="{80394A4F-406B-36BD-74F1-B5D4E71043BB}"/>
+          </ac:spMkLst>
+        </pc:spChg>
+        <pc:spChg chg="add mod">
+          <ac:chgData name="François GLEYZON" userId="a2d04f23f7faf3ef" providerId="LiveId" clId="{1404D58C-429C-4D75-B5B2-E1C9B8E0DC36}" dt="2025-03-16T15:10:21.692" v="2647" actId="113"/>
+          <ac:spMkLst>
+            <pc:docMk/>
+            <pc:sldMk cId="2830059827" sldId="269"/>
+            <ac:spMk id="3" creationId="{1C52FBAC-7EC8-BE7C-95EC-C16D6E8AF899}"/>
+          </ac:spMkLst>
+        </pc:spChg>
+        <pc:spChg chg="add mod">
+          <ac:chgData name="François GLEYZON" userId="a2d04f23f7faf3ef" providerId="LiveId" clId="{1404D58C-429C-4D75-B5B2-E1C9B8E0DC36}" dt="2025-03-16T15:06:51.653" v="2533" actId="1035"/>
+          <ac:spMkLst>
+            <pc:docMk/>
+            <pc:sldMk cId="2830059827" sldId="269"/>
+            <ac:spMk id="4" creationId="{78B77FF1-8B2E-A1A3-EF89-C57622AB1454}"/>
+          </ac:spMkLst>
+        </pc:spChg>
+        <pc:spChg chg="add mod">
+          <ac:chgData name="François GLEYZON" userId="a2d04f23f7faf3ef" providerId="LiveId" clId="{1404D58C-429C-4D75-B5B2-E1C9B8E0DC36}" dt="2025-03-16T15:06:51.653" v="2533" actId="1035"/>
+          <ac:spMkLst>
+            <pc:docMk/>
+            <pc:sldMk cId="2830059827" sldId="269"/>
+            <ac:spMk id="5" creationId="{739A139A-CC56-81D5-3FFE-43CECF04B84D}"/>
+          </ac:spMkLst>
+        </pc:spChg>
+        <pc:spChg chg="add mod">
+          <ac:chgData name="François GLEYZON" userId="a2d04f23f7faf3ef" providerId="LiveId" clId="{1404D58C-429C-4D75-B5B2-E1C9B8E0DC36}" dt="2025-03-16T15:06:51.653" v="2533" actId="1035"/>
+          <ac:spMkLst>
+            <pc:docMk/>
+            <pc:sldMk cId="2830059827" sldId="269"/>
+            <ac:spMk id="6" creationId="{A343BD2D-3517-D6F9-AED8-67B2A11B82DC}"/>
+          </ac:spMkLst>
+        </pc:spChg>
+        <pc:spChg chg="add mod">
+          <ac:chgData name="François GLEYZON" userId="a2d04f23f7faf3ef" providerId="LiveId" clId="{1404D58C-429C-4D75-B5B2-E1C9B8E0DC36}" dt="2025-03-16T15:09:51.483" v="2643" actId="1076"/>
+          <ac:spMkLst>
+            <pc:docMk/>
+            <pc:sldMk cId="2830059827" sldId="269"/>
+            <ac:spMk id="7" creationId="{2AD06AC7-B335-02C5-39E6-6F2C36E7AA8C}"/>
+          </ac:spMkLst>
+        </pc:spChg>
+        <pc:spChg chg="add mod">
+          <ac:chgData name="François GLEYZON" userId="a2d04f23f7faf3ef" providerId="LiveId" clId="{1404D58C-429C-4D75-B5B2-E1C9B8E0DC36}" dt="2025-03-27T15:47:37.838" v="7428" actId="14100"/>
+          <ac:spMkLst>
+            <pc:docMk/>
+            <pc:sldMk cId="2830059827" sldId="269"/>
+            <ac:spMk id="8" creationId="{F42AAFE0-6C2A-03C7-A118-435301C2CC37}"/>
+          </ac:spMkLst>
+        </pc:spChg>
+        <pc:spChg chg="add mod">
+          <ac:chgData name="François GLEYZON" userId="a2d04f23f7faf3ef" providerId="LiveId" clId="{1404D58C-429C-4D75-B5B2-E1C9B8E0DC36}" dt="2025-03-16T15:25:15.576" v="3276" actId="113"/>
+          <ac:spMkLst>
+            <pc:docMk/>
+            <pc:sldMk cId="2830059827" sldId="269"/>
+            <ac:spMk id="11" creationId="{80852BB1-1AEF-BA63-A523-0B2E23F62449}"/>
+          </ac:spMkLst>
+        </pc:spChg>
+        <pc:spChg chg="add mod">
+          <ac:chgData name="François GLEYZON" userId="a2d04f23f7faf3ef" providerId="LiveId" clId="{1404D58C-429C-4D75-B5B2-E1C9B8E0DC36}" dt="2025-03-16T18:28:40.057" v="7126" actId="113"/>
+          <ac:spMkLst>
+            <pc:docMk/>
+            <pc:sldMk cId="2830059827" sldId="269"/>
+            <ac:spMk id="17" creationId="{D1FEB786-966B-0D83-37C9-2EBFF8D0D322}"/>
+          </ac:spMkLst>
+        </pc:spChg>
+        <pc:spChg chg="add mod">
+          <ac:chgData name="François GLEYZON" userId="a2d04f23f7faf3ef" providerId="LiveId" clId="{1404D58C-429C-4D75-B5B2-E1C9B8E0DC36}" dt="2025-03-16T15:14:56.424" v="2791" actId="1076"/>
+          <ac:spMkLst>
+            <pc:docMk/>
+            <pc:sldMk cId="2830059827" sldId="269"/>
+            <ac:spMk id="18" creationId="{2DA8E8F2-2AF9-DB7D-FA62-83A39D6661D9}"/>
+          </ac:spMkLst>
+        </pc:spChg>
+        <pc:spChg chg="add mod">
+          <ac:chgData name="François GLEYZON" userId="a2d04f23f7faf3ef" providerId="LiveId" clId="{1404D58C-429C-4D75-B5B2-E1C9B8E0DC36}" dt="2025-03-16T15:14:59.278" v="2792" actId="20577"/>
+          <ac:spMkLst>
+            <pc:docMk/>
+            <pc:sldMk cId="2830059827" sldId="269"/>
+            <ac:spMk id="19" creationId="{EEC0C2AA-6F3D-50A5-6859-E9FF640D7681}"/>
+          </ac:spMkLst>
+        </pc:spChg>
+        <pc:spChg chg="add mod">
+          <ac:chgData name="François GLEYZON" userId="a2d04f23f7faf3ef" providerId="LiveId" clId="{1404D58C-429C-4D75-B5B2-E1C9B8E0DC36}" dt="2025-03-16T15:15:33.082" v="2879" actId="20577"/>
+          <ac:spMkLst>
+            <pc:docMk/>
+            <pc:sldMk cId="2830059827" sldId="269"/>
+            <ac:spMk id="21" creationId="{52EED8E5-7326-32DB-C13F-1498B2A40CDF}"/>
+          </ac:spMkLst>
+        </pc:spChg>
+        <pc:spChg chg="add mod">
+          <ac:chgData name="François GLEYZON" userId="a2d04f23f7faf3ef" providerId="LiveId" clId="{1404D58C-429C-4D75-B5B2-E1C9B8E0DC36}" dt="2025-03-16T15:19:24.017" v="3044" actId="1076"/>
+          <ac:spMkLst>
+            <pc:docMk/>
+            <pc:sldMk cId="2830059827" sldId="269"/>
+            <ac:spMk id="24" creationId="{BD3233B2-F816-A13E-92F5-924BA2130E34}"/>
+          </ac:spMkLst>
+        </pc:spChg>
+        <pc:spChg chg="add mod">
+          <ac:chgData name="François GLEYZON" userId="a2d04f23f7faf3ef" providerId="LiveId" clId="{1404D58C-429C-4D75-B5B2-E1C9B8E0DC36}" dt="2025-03-27T15:47:18.234" v="7423"/>
+          <ac:spMkLst>
+            <pc:docMk/>
+            <pc:sldMk cId="2830059827" sldId="269"/>
+            <ac:spMk id="25" creationId="{5FCF3EA4-1C17-404E-D7DC-4DCD39E349EE}"/>
+          </ac:spMkLst>
+        </pc:spChg>
+        <pc:picChg chg="add mod">
+          <ac:chgData name="François GLEYZON" userId="a2d04f23f7faf3ef" providerId="LiveId" clId="{1404D58C-429C-4D75-B5B2-E1C9B8E0DC36}" dt="2025-03-27T15:47:44.026" v="7434" actId="1037"/>
+          <ac:picMkLst>
+            <pc:docMk/>
+            <pc:sldMk cId="2830059827" sldId="269"/>
+            <ac:picMk id="1026" creationId="{631B88E2-7308-4AA9-E4DD-AC0360CF9821}"/>
+          </ac:picMkLst>
+        </pc:picChg>
+        <pc:cxnChg chg="add mod">
+          <ac:chgData name="François GLEYZON" userId="a2d04f23f7faf3ef" providerId="LiveId" clId="{1404D58C-429C-4D75-B5B2-E1C9B8E0DC36}" dt="2025-03-16T15:10:55.005" v="2660" actId="20577"/>
+          <ac:cxnSpMkLst>
+            <pc:docMk/>
+            <pc:sldMk cId="2830059827" sldId="269"/>
+            <ac:cxnSpMk id="10" creationId="{FA3DA1B2-AD0A-283D-1F5D-AD9276E7401C}"/>
+          </ac:cxnSpMkLst>
+        </pc:cxnChg>
+        <pc:cxnChg chg="add mod">
+          <ac:chgData name="François GLEYZON" userId="a2d04f23f7faf3ef" providerId="LiveId" clId="{1404D58C-429C-4D75-B5B2-E1C9B8E0DC36}" dt="2025-03-16T15:15:39.872" v="2882" actId="14100"/>
+          <ac:cxnSpMkLst>
+            <pc:docMk/>
+            <pc:sldMk cId="2830059827" sldId="269"/>
+            <ac:cxnSpMk id="20" creationId="{EFED52EE-D353-671B-312B-C6260B9FA771}"/>
+          </ac:cxnSpMkLst>
+        </pc:cxnChg>
+      </pc:sldChg>
+      <pc:sldChg chg="addSp modSp add mod">
+        <pc:chgData name="François GLEYZON" userId="a2d04f23f7faf3ef" providerId="LiveId" clId="{1404D58C-429C-4D75-B5B2-E1C9B8E0DC36}" dt="2025-03-16T14:36:37.943" v="1520"/>
+        <pc:sldMkLst>
+          <pc:docMk/>
+          <pc:sldMk cId="3668441629" sldId="270"/>
+        </pc:sldMkLst>
+        <pc:spChg chg="add mod">
+          <ac:chgData name="François GLEYZON" userId="a2d04f23f7faf3ef" providerId="LiveId" clId="{1404D58C-429C-4D75-B5B2-E1C9B8E0DC36}" dt="2025-03-16T14:36:37.943" v="1520"/>
+          <ac:spMkLst>
+            <pc:docMk/>
+            <pc:sldMk cId="3668441629" sldId="270"/>
+            <ac:spMk id="2" creationId="{59F282F9-3609-1522-0AA2-327E0A7E7A9B}"/>
+          </ac:spMkLst>
+        </pc:spChg>
+        <pc:spChg chg="mod">
+          <ac:chgData name="François GLEYZON" userId="a2d04f23f7faf3ef" providerId="LiveId" clId="{1404D58C-429C-4D75-B5B2-E1C9B8E0DC36}" dt="2025-03-16T14:17:42.635" v="76" actId="20577"/>
+          <ac:spMkLst>
+            <pc:docMk/>
+            <pc:sldMk cId="3668441629" sldId="270"/>
+            <ac:spMk id="9" creationId="{9D2D06DC-6CE6-B872-3049-9B0D28F68101}"/>
+          </ac:spMkLst>
+        </pc:spChg>
+      </pc:sldChg>
+      <pc:sldChg chg="addSp modSp add mod">
+        <pc:chgData name="François GLEYZON" userId="a2d04f23f7faf3ef" providerId="LiveId" clId="{1404D58C-429C-4D75-B5B2-E1C9B8E0DC36}" dt="2025-03-16T14:36:40.083" v="1521"/>
+        <pc:sldMkLst>
+          <pc:docMk/>
+          <pc:sldMk cId="1301843568" sldId="271"/>
+        </pc:sldMkLst>
+        <pc:spChg chg="add mod">
+          <ac:chgData name="François GLEYZON" userId="a2d04f23f7faf3ef" providerId="LiveId" clId="{1404D58C-429C-4D75-B5B2-E1C9B8E0DC36}" dt="2025-03-16T14:36:40.083" v="1521"/>
+          <ac:spMkLst>
+            <pc:docMk/>
+            <pc:sldMk cId="1301843568" sldId="271"/>
+            <ac:spMk id="2" creationId="{B03F54C8-C74E-296C-FF98-648447B3C076}"/>
+          </ac:spMkLst>
+        </pc:spChg>
+        <pc:spChg chg="mod">
+          <ac:chgData name="François GLEYZON" userId="a2d04f23f7faf3ef" providerId="LiveId" clId="{1404D58C-429C-4D75-B5B2-E1C9B8E0DC36}" dt="2025-03-16T14:17:52.241" v="97" actId="20577"/>
+          <ac:spMkLst>
+            <pc:docMk/>
+            <pc:sldMk cId="1301843568" sldId="271"/>
+            <ac:spMk id="9" creationId="{9AC59951-2052-5891-EC5A-4BBED090FE92}"/>
+          </ac:spMkLst>
+        </pc:spChg>
+      </pc:sldChg>
+      <pc:sldChg chg="addSp delSp modSp add mod">
+        <pc:chgData name="François GLEYZON" userId="a2d04f23f7faf3ef" providerId="LiveId" clId="{1404D58C-429C-4D75-B5B2-E1C9B8E0DC36}" dt="2025-03-16T18:21:18.427" v="6846" actId="1038"/>
+        <pc:sldMkLst>
+          <pc:docMk/>
+          <pc:sldMk cId="1767245589" sldId="272"/>
+        </pc:sldMkLst>
+        <pc:spChg chg="add mod">
+          <ac:chgData name="François GLEYZON" userId="a2d04f23f7faf3ef" providerId="LiveId" clId="{1404D58C-429C-4D75-B5B2-E1C9B8E0DC36}" dt="2025-03-16T14:36:41.923" v="1522"/>
+          <ac:spMkLst>
+            <pc:docMk/>
+            <pc:sldMk cId="1767245589" sldId="272"/>
+            <ac:spMk id="2" creationId="{281E66B3-EC50-1DB7-5246-A0A1D85B27B2}"/>
+          </ac:spMkLst>
+        </pc:spChg>
+        <pc:spChg chg="add mod">
+          <ac:chgData name="François GLEYZON" userId="a2d04f23f7faf3ef" providerId="LiveId" clId="{1404D58C-429C-4D75-B5B2-E1C9B8E0DC36}" dt="2025-03-16T17:38:31.338" v="3598" actId="113"/>
+          <ac:spMkLst>
+            <pc:docMk/>
+            <pc:sldMk cId="1767245589" sldId="272"/>
+            <ac:spMk id="5" creationId="{E13FB8D1-D18F-47C7-D1B2-4705A4773972}"/>
+          </ac:spMkLst>
+        </pc:spChg>
+        <pc:spChg chg="add mod">
+          <ac:chgData name="François GLEYZON" userId="a2d04f23f7faf3ef" providerId="LiveId" clId="{1404D58C-429C-4D75-B5B2-E1C9B8E0DC36}" dt="2025-03-16T17:43:23.848" v="3944" actId="20577"/>
+          <ac:spMkLst>
+            <pc:docMk/>
+            <pc:sldMk cId="1767245589" sldId="272"/>
+            <ac:spMk id="6" creationId="{9D3F7280-79FE-6679-FD09-21759D67BD31}"/>
+          </ac:spMkLst>
+        </pc:spChg>
+        <pc:spChg chg="mod">
+          <ac:chgData name="François GLEYZON" userId="a2d04f23f7faf3ef" providerId="LiveId" clId="{1404D58C-429C-4D75-B5B2-E1C9B8E0DC36}" dt="2025-03-16T14:18:01.236" v="108" actId="20577"/>
+          <ac:spMkLst>
+            <pc:docMk/>
+            <pc:sldMk cId="1767245589" sldId="272"/>
+            <ac:spMk id="9" creationId="{D60C7752-751C-B280-204E-C5F5E4B10805}"/>
+          </ac:spMkLst>
+        </pc:spChg>
+        <pc:spChg chg="add mod">
+          <ac:chgData name="François GLEYZON" userId="a2d04f23f7faf3ef" providerId="LiveId" clId="{1404D58C-429C-4D75-B5B2-E1C9B8E0DC36}" dt="2025-03-16T18:02:10.159" v="6248" actId="1076"/>
+          <ac:spMkLst>
+            <pc:docMk/>
+            <pc:sldMk cId="1767245589" sldId="272"/>
+            <ac:spMk id="10" creationId="{FB7FDD76-3978-200B-32AC-62FEBBC52D44}"/>
+          </ac:spMkLst>
+        </pc:spChg>
+        <pc:spChg chg="add mod">
+          <ac:chgData name="François GLEYZON" userId="a2d04f23f7faf3ef" providerId="LiveId" clId="{1404D58C-429C-4D75-B5B2-E1C9B8E0DC36}" dt="2025-03-16T18:02:15.543" v="6249" actId="465"/>
+          <ac:spMkLst>
+            <pc:docMk/>
+            <pc:sldMk cId="1767245589" sldId="272"/>
+            <ac:spMk id="11" creationId="{1A607B03-1BC0-C771-595F-432338076A8B}"/>
+          </ac:spMkLst>
+        </pc:spChg>
+        <pc:spChg chg="add mod">
+          <ac:chgData name="François GLEYZON" userId="a2d04f23f7faf3ef" providerId="LiveId" clId="{1404D58C-429C-4D75-B5B2-E1C9B8E0DC36}" dt="2025-03-16T18:02:10.159" v="6248" actId="1076"/>
+          <ac:spMkLst>
+            <pc:docMk/>
+            <pc:sldMk cId="1767245589" sldId="272"/>
+            <ac:spMk id="12" creationId="{EEF1FBAD-7C20-C706-E6A5-B20EBC80F0F6}"/>
+          </ac:spMkLst>
+        </pc:spChg>
+        <pc:spChg chg="add mod">
+          <ac:chgData name="François GLEYZON" userId="a2d04f23f7faf3ef" providerId="LiveId" clId="{1404D58C-429C-4D75-B5B2-E1C9B8E0DC36}" dt="2025-03-16T18:09:11.697" v="6453" actId="1076"/>
+          <ac:spMkLst>
+            <pc:docMk/>
+            <pc:sldMk cId="1767245589" sldId="272"/>
+            <ac:spMk id="41" creationId="{DFB335B7-5A67-A708-9BF0-15568CAD7AA8}"/>
+          </ac:spMkLst>
+        </pc:spChg>
+        <pc:spChg chg="add mod">
+          <ac:chgData name="François GLEYZON" userId="a2d04f23f7faf3ef" providerId="LiveId" clId="{1404D58C-429C-4D75-B5B2-E1C9B8E0DC36}" dt="2025-03-16T18:21:18.427" v="6846" actId="1038"/>
+          <ac:spMkLst>
+            <pc:docMk/>
+            <pc:sldMk cId="1767245589" sldId="272"/>
+            <ac:spMk id="42" creationId="{2585DC19-B449-1015-A282-9C33F7EDCA40}"/>
+          </ac:spMkLst>
+        </pc:spChg>
+        <pc:picChg chg="add mod">
+          <ac:chgData name="François GLEYZON" userId="a2d04f23f7faf3ef" providerId="LiveId" clId="{1404D58C-429C-4D75-B5B2-E1C9B8E0DC36}" dt="2025-03-16T17:38:33.760" v="3599" actId="1076"/>
+          <ac:picMkLst>
+            <pc:docMk/>
+            <pc:sldMk cId="1767245589" sldId="272"/>
+            <ac:picMk id="4" creationId="{53ED0A81-57CD-C16F-8A9A-2BCDAA3F406E}"/>
+          </ac:picMkLst>
+        </pc:picChg>
+        <pc:picChg chg="add mod">
+          <ac:chgData name="François GLEYZON" userId="a2d04f23f7faf3ef" providerId="LiveId" clId="{1404D58C-429C-4D75-B5B2-E1C9B8E0DC36}" dt="2025-03-16T18:02:22.290" v="6250" actId="1076"/>
+          <ac:picMkLst>
+            <pc:docMk/>
+            <pc:sldMk cId="1767245589" sldId="272"/>
+            <ac:picMk id="8" creationId="{8A31FEA3-15F3-A5B2-8631-79D870FD9189}"/>
+          </ac:picMkLst>
+        </pc:picChg>
+        <pc:picChg chg="add mod">
+          <ac:chgData name="François GLEYZON" userId="a2d04f23f7faf3ef" providerId="LiveId" clId="{1404D58C-429C-4D75-B5B2-E1C9B8E0DC36}" dt="2025-03-16T18:06:56.413" v="6270" actId="1076"/>
+          <ac:picMkLst>
+            <pc:docMk/>
+            <pc:sldMk cId="1767245589" sldId="272"/>
+            <ac:picMk id="25" creationId="{33ED872E-179F-A9C0-F2A5-3AD41FFB9EF1}"/>
+          </ac:picMkLst>
+        </pc:picChg>
+        <pc:cxnChg chg="add mod">
+          <ac:chgData name="François GLEYZON" userId="a2d04f23f7faf3ef" providerId="LiveId" clId="{1404D58C-429C-4D75-B5B2-E1C9B8E0DC36}" dt="2025-03-16T18:02:32.678" v="6253" actId="14100"/>
+          <ac:cxnSpMkLst>
+            <pc:docMk/>
+            <pc:sldMk cId="1767245589" sldId="272"/>
+            <ac:cxnSpMk id="13" creationId="{D49B9546-9E06-3F1B-67AE-CDE54685608B}"/>
+          </ac:cxnSpMkLst>
+        </pc:cxnChg>
+        <pc:cxnChg chg="add mod">
+          <ac:chgData name="François GLEYZON" userId="a2d04f23f7faf3ef" providerId="LiveId" clId="{1404D58C-429C-4D75-B5B2-E1C9B8E0DC36}" dt="2025-03-16T18:02:38.187" v="6256" actId="14100"/>
+          <ac:cxnSpMkLst>
+            <pc:docMk/>
+            <pc:sldMk cId="1767245589" sldId="272"/>
+            <ac:cxnSpMk id="16" creationId="{80972539-C73D-4278-5BF7-104942B2DDC7}"/>
+          </ac:cxnSpMkLst>
+        </pc:cxnChg>
+        <pc:cxnChg chg="add mod">
+          <ac:chgData name="François GLEYZON" userId="a2d04f23f7faf3ef" providerId="LiveId" clId="{1404D58C-429C-4D75-B5B2-E1C9B8E0DC36}" dt="2025-03-16T18:02:56.302" v="6263" actId="1076"/>
+          <ac:cxnSpMkLst>
+            <pc:docMk/>
+            <pc:sldMk cId="1767245589" sldId="272"/>
+            <ac:cxnSpMk id="22" creationId="{5F64B1CF-78E3-E145-2A94-E4E959096099}"/>
+          </ac:cxnSpMkLst>
+        </pc:cxnChg>
+        <pc:cxnChg chg="add mod">
+          <ac:chgData name="François GLEYZON" userId="a2d04f23f7faf3ef" providerId="LiveId" clId="{1404D58C-429C-4D75-B5B2-E1C9B8E0DC36}" dt="2025-03-16T18:07:23.828" v="6276" actId="1076"/>
+          <ac:cxnSpMkLst>
+            <pc:docMk/>
+            <pc:sldMk cId="1767245589" sldId="272"/>
+            <ac:cxnSpMk id="26" creationId="{24747122-5B36-739F-9F5D-A25E30C5894E}"/>
+          </ac:cxnSpMkLst>
+        </pc:cxnChg>
+        <pc:cxnChg chg="add mod">
+          <ac:chgData name="François GLEYZON" userId="a2d04f23f7faf3ef" providerId="LiveId" clId="{1404D58C-429C-4D75-B5B2-E1C9B8E0DC36}" dt="2025-03-16T18:08:12.757" v="6293" actId="1076"/>
+          <ac:cxnSpMkLst>
+            <pc:docMk/>
+            <pc:sldMk cId="1767245589" sldId="272"/>
+            <ac:cxnSpMk id="29" creationId="{ED3FFF44-1763-2C72-B7EF-4BAA1E20308F}"/>
+          </ac:cxnSpMkLst>
+        </pc:cxnChg>
+        <pc:cxnChg chg="add mod">
+          <ac:chgData name="François GLEYZON" userId="a2d04f23f7faf3ef" providerId="LiveId" clId="{1404D58C-429C-4D75-B5B2-E1C9B8E0DC36}" dt="2025-03-16T18:08:12.757" v="6293" actId="1076"/>
+          <ac:cxnSpMkLst>
+            <pc:docMk/>
+            <pc:sldMk cId="1767245589" sldId="272"/>
+            <ac:cxnSpMk id="30" creationId="{ED17C5F0-368F-E284-A61A-C3045C6891D1}"/>
+          </ac:cxnSpMkLst>
+        </pc:cxnChg>
+        <pc:cxnChg chg="add mod">
+          <ac:chgData name="François GLEYZON" userId="a2d04f23f7faf3ef" providerId="LiveId" clId="{1404D58C-429C-4D75-B5B2-E1C9B8E0DC36}" dt="2025-03-16T18:08:12.757" v="6293" actId="1076"/>
+          <ac:cxnSpMkLst>
+            <pc:docMk/>
+            <pc:sldMk cId="1767245589" sldId="272"/>
+            <ac:cxnSpMk id="32" creationId="{EBF41D9D-82DF-C3F4-5E79-9F90515FE944}"/>
+          </ac:cxnSpMkLst>
+        </pc:cxnChg>
+        <pc:cxnChg chg="add mod">
+          <ac:chgData name="François GLEYZON" userId="a2d04f23f7faf3ef" providerId="LiveId" clId="{1404D58C-429C-4D75-B5B2-E1C9B8E0DC36}" dt="2025-03-16T18:08:12.757" v="6293" actId="1076"/>
+          <ac:cxnSpMkLst>
+            <pc:docMk/>
+            <pc:sldMk cId="1767245589" sldId="272"/>
+            <ac:cxnSpMk id="33" creationId="{485B08DD-0A2D-7F00-A27D-0359CCD8796F}"/>
+          </ac:cxnSpMkLst>
+        </pc:cxnChg>
+        <pc:cxnChg chg="add mod">
+          <ac:chgData name="François GLEYZON" userId="a2d04f23f7faf3ef" providerId="LiveId" clId="{1404D58C-429C-4D75-B5B2-E1C9B8E0DC36}" dt="2025-03-16T18:08:12.757" v="6293" actId="1076"/>
+          <ac:cxnSpMkLst>
+            <pc:docMk/>
+            <pc:sldMk cId="1767245589" sldId="272"/>
+            <ac:cxnSpMk id="34" creationId="{0B4B6C7C-6463-E2E8-72B3-5CFE5A079E3B}"/>
+          </ac:cxnSpMkLst>
+        </pc:cxnChg>
+        <pc:cxnChg chg="add mod">
+          <ac:chgData name="François GLEYZON" userId="a2d04f23f7faf3ef" providerId="LiveId" clId="{1404D58C-429C-4D75-B5B2-E1C9B8E0DC36}" dt="2025-03-16T18:08:12.757" v="6293" actId="1076"/>
+          <ac:cxnSpMkLst>
+            <pc:docMk/>
+            <pc:sldMk cId="1767245589" sldId="272"/>
+            <ac:cxnSpMk id="35" creationId="{03D955B2-F219-8CB6-1E53-3AA6415D6650}"/>
+          </ac:cxnSpMkLst>
+        </pc:cxnChg>
+        <pc:cxnChg chg="add mod">
+          <ac:chgData name="François GLEYZON" userId="a2d04f23f7faf3ef" providerId="LiveId" clId="{1404D58C-429C-4D75-B5B2-E1C9B8E0DC36}" dt="2025-03-16T18:08:12.757" v="6293" actId="1076"/>
+          <ac:cxnSpMkLst>
+            <pc:docMk/>
+            <pc:sldMk cId="1767245589" sldId="272"/>
+            <ac:cxnSpMk id="37" creationId="{16D7FD71-B1AD-0F14-A6E2-E849307A4B3A}"/>
+          </ac:cxnSpMkLst>
+        </pc:cxnChg>
+        <pc:cxnChg chg="add mod">
+          <ac:chgData name="François GLEYZON" userId="a2d04f23f7faf3ef" providerId="LiveId" clId="{1404D58C-429C-4D75-B5B2-E1C9B8E0DC36}" dt="2025-03-16T18:08:12.757" v="6293" actId="1076"/>
+          <ac:cxnSpMkLst>
+            <pc:docMk/>
+            <pc:sldMk cId="1767245589" sldId="272"/>
+            <ac:cxnSpMk id="38" creationId="{8618A658-E824-26F7-2526-3280361FFBE8}"/>
+          </ac:cxnSpMkLst>
+        </pc:cxnChg>
+        <pc:cxnChg chg="add mod">
+          <ac:chgData name="François GLEYZON" userId="a2d04f23f7faf3ef" providerId="LiveId" clId="{1404D58C-429C-4D75-B5B2-E1C9B8E0DC36}" dt="2025-03-16T18:08:12.757" v="6293" actId="1076"/>
+          <ac:cxnSpMkLst>
+            <pc:docMk/>
+            <pc:sldMk cId="1767245589" sldId="272"/>
+            <ac:cxnSpMk id="40" creationId="{CC554D35-7624-2528-FD55-5AD0D0D02370}"/>
+          </ac:cxnSpMkLst>
+        </pc:cxnChg>
+      </pc:sldChg>
+      <pc:sldChg chg="addSp delSp modSp add mod">
+        <pc:chgData name="François GLEYZON" userId="a2d04f23f7faf3ef" providerId="LiveId" clId="{1404D58C-429C-4D75-B5B2-E1C9B8E0DC36}" dt="2025-03-27T21:10:24.446" v="8858" actId="20577"/>
+        <pc:sldMkLst>
+          <pc:docMk/>
+          <pc:sldMk cId="3992977093" sldId="273"/>
+        </pc:sldMkLst>
+        <pc:spChg chg="add mod">
+          <ac:chgData name="François GLEYZON" userId="a2d04f23f7faf3ef" providerId="LiveId" clId="{1404D58C-429C-4D75-B5B2-E1C9B8E0DC36}" dt="2025-03-16T14:36:45.214" v="1523"/>
+          <ac:spMkLst>
+            <pc:docMk/>
+            <pc:sldMk cId="3992977093" sldId="273"/>
+            <ac:spMk id="2" creationId="{0042AAB7-5C77-4BBB-D2D5-854226AC3ED2}"/>
+          </ac:spMkLst>
+        </pc:spChg>
+        <pc:spChg chg="add mod">
+          <ac:chgData name="François GLEYZON" userId="a2d04f23f7faf3ef" providerId="LiveId" clId="{1404D58C-429C-4D75-B5B2-E1C9B8E0DC36}" dt="2025-03-27T20:58:54.799" v="7856" actId="20577"/>
+          <ac:spMkLst>
+            <pc:docMk/>
+            <pc:sldMk cId="3992977093" sldId="273"/>
+            <ac:spMk id="3" creationId="{E3F04533-03AC-21EF-93FD-83141649C652}"/>
+          </ac:spMkLst>
+        </pc:spChg>
+        <pc:spChg chg="add mod">
+          <ac:chgData name="François GLEYZON" userId="a2d04f23f7faf3ef" providerId="LiveId" clId="{1404D58C-429C-4D75-B5B2-E1C9B8E0DC36}" dt="2025-03-27T20:54:53.533" v="7835" actId="14100"/>
+          <ac:spMkLst>
+            <pc:docMk/>
+            <pc:sldMk cId="3992977093" sldId="273"/>
+            <ac:spMk id="5" creationId="{553BCEC3-A8F4-DAC1-BEC4-21AF39FC432C}"/>
+          </ac:spMkLst>
+        </pc:spChg>
+        <pc:spChg chg="mod">
+          <ac:chgData name="François GLEYZON" userId="a2d04f23f7faf3ef" providerId="LiveId" clId="{1404D58C-429C-4D75-B5B2-E1C9B8E0DC36}" dt="2025-03-16T14:18:10.318" v="137" actId="20577"/>
+          <ac:spMkLst>
+            <pc:docMk/>
+            <pc:sldMk cId="3992977093" sldId="273"/>
+            <ac:spMk id="9" creationId="{C9B5B16C-1DB0-E947-93DF-D6622677A8E5}"/>
+          </ac:spMkLst>
+        </pc:spChg>
+        <pc:spChg chg="add mod">
+          <ac:chgData name="François GLEYZON" userId="a2d04f23f7faf3ef" providerId="LiveId" clId="{1404D58C-429C-4D75-B5B2-E1C9B8E0DC36}" dt="2025-03-27T21:03:57.591" v="8432" actId="20577"/>
+          <ac:spMkLst>
+            <pc:docMk/>
+            <pc:sldMk cId="3992977093" sldId="273"/>
+            <ac:spMk id="13" creationId="{4F92AAEB-8362-34E4-82A1-BF26B6648AA5}"/>
+          </ac:spMkLst>
+        </pc:spChg>
+        <pc:spChg chg="add mod">
+          <ac:chgData name="François GLEYZON" userId="a2d04f23f7faf3ef" providerId="LiveId" clId="{1404D58C-429C-4D75-B5B2-E1C9B8E0DC36}" dt="2025-03-27T21:10:24.446" v="8858" actId="20577"/>
+          <ac:spMkLst>
+            <pc:docMk/>
+            <pc:sldMk cId="3992977093" sldId="273"/>
+            <ac:spMk id="14" creationId="{48BDC8D2-B524-1313-821E-AE3DCCAD58E5}"/>
+          </ac:spMkLst>
+        </pc:spChg>
+        <pc:picChg chg="add mod">
+          <ac:chgData name="François GLEYZON" userId="a2d04f23f7faf3ef" providerId="LiveId" clId="{1404D58C-429C-4D75-B5B2-E1C9B8E0DC36}" dt="2025-03-27T20:54:32.814" v="7811"/>
+          <ac:picMkLst>
+            <pc:docMk/>
+            <pc:sldMk cId="3992977093" sldId="273"/>
+            <ac:picMk id="4" creationId="{91688AE2-5959-A781-FCEA-3219A0B37ED1}"/>
+          </ac:picMkLst>
+        </pc:picChg>
+        <pc:picChg chg="add mod">
+          <ac:chgData name="François GLEYZON" userId="a2d04f23f7faf3ef" providerId="LiveId" clId="{1404D58C-429C-4D75-B5B2-E1C9B8E0DC36}" dt="2025-03-27T20:56:52.069" v="7850" actId="1076"/>
+          <ac:picMkLst>
+            <pc:docMk/>
+            <pc:sldMk cId="3992977093" sldId="273"/>
+            <ac:picMk id="7" creationId="{95DA9114-B9DC-EAA8-3C4C-01EE1B196BB1}"/>
+          </ac:picMkLst>
+        </pc:picChg>
+        <pc:picChg chg="add mod">
+          <ac:chgData name="François GLEYZON" userId="a2d04f23f7faf3ef" providerId="LiveId" clId="{1404D58C-429C-4D75-B5B2-E1C9B8E0DC36}" dt="2025-03-27T20:56:52.069" v="7850" actId="1076"/>
+          <ac:picMkLst>
+            <pc:docMk/>
+            <pc:sldMk cId="3992977093" sldId="273"/>
+            <ac:picMk id="10" creationId="{71B00AE5-45C4-9ACA-101A-43DB73FF576D}"/>
+          </ac:picMkLst>
+        </pc:picChg>
+        <pc:picChg chg="add del mod">
+          <ac:chgData name="François GLEYZON" userId="a2d04f23f7faf3ef" providerId="LiveId" clId="{1404D58C-429C-4D75-B5B2-E1C9B8E0DC36}" dt="2025-03-27T20:56:35.793" v="7847" actId="21"/>
+          <ac:picMkLst>
+            <pc:docMk/>
+            <pc:sldMk cId="3992977093" sldId="273"/>
+            <ac:picMk id="12" creationId="{3E431663-A0A1-F147-8DD1-649B435558AF}"/>
+          </ac:picMkLst>
+        </pc:picChg>
+      </pc:sldChg>
+      <pc:sldChg chg="addSp delSp modSp add mod">
+        <pc:chgData name="François GLEYZON" userId="a2d04f23f7faf3ef" providerId="LiveId" clId="{1404D58C-429C-4D75-B5B2-E1C9B8E0DC36}" dt="2025-03-16T18:23:52.809" v="6936" actId="113"/>
+        <pc:sldMkLst>
+          <pc:docMk/>
+          <pc:sldMk cId="1403034857" sldId="274"/>
+        </pc:sldMkLst>
+        <pc:spChg chg="add mod">
+          <ac:chgData name="François GLEYZON" userId="a2d04f23f7faf3ef" providerId="LiveId" clId="{1404D58C-429C-4D75-B5B2-E1C9B8E0DC36}" dt="2025-03-16T17:42:43.868" v="3939" actId="20577"/>
+          <ac:spMkLst>
+            <pc:docMk/>
+            <pc:sldMk cId="1403034857" sldId="274"/>
+            <ac:spMk id="2" creationId="{250421EB-6552-6AB6-6F25-DA6377842E5D}"/>
+          </ac:spMkLst>
+        </pc:spChg>
+        <pc:spChg chg="add mod">
+          <ac:chgData name="François GLEYZON" userId="a2d04f23f7faf3ef" providerId="LiveId" clId="{1404D58C-429C-4D75-B5B2-E1C9B8E0DC36}" dt="2025-03-16T14:34:27.905" v="1172" actId="20577"/>
+          <ac:spMkLst>
+            <pc:docMk/>
+            <pc:sldMk cId="1403034857" sldId="274"/>
+            <ac:spMk id="4" creationId="{E3C49277-8E12-BB83-3B74-7BE038B51A44}"/>
+          </ac:spMkLst>
+        </pc:spChg>
+        <pc:spChg chg="add mod">
+          <ac:chgData name="François GLEYZON" userId="a2d04f23f7faf3ef" providerId="LiveId" clId="{1404D58C-429C-4D75-B5B2-E1C9B8E0DC36}" dt="2025-03-16T14:36:33.003" v="1517"/>
+          <ac:spMkLst>
+            <pc:docMk/>
+            <pc:sldMk cId="1403034857" sldId="274"/>
+            <ac:spMk id="6" creationId="{47CB0EFF-830F-8349-9DB3-FB9A307C5887}"/>
+          </ac:spMkLst>
+        </pc:spChg>
+        <pc:spChg chg="add mod">
+          <ac:chgData name="François GLEYZON" userId="a2d04f23f7faf3ef" providerId="LiveId" clId="{1404D58C-429C-4D75-B5B2-E1C9B8E0DC36}" dt="2025-03-16T14:41:39.123" v="2068" actId="20577"/>
+          <ac:spMkLst>
+            <pc:docMk/>
+            <pc:sldMk cId="1403034857" sldId="274"/>
+            <ac:spMk id="8" creationId="{23AAE550-8793-C14A-40F5-CD14768E5CC4}"/>
+          </ac:spMkLst>
+        </pc:spChg>
+        <pc:spChg chg="mod">
+          <ac:chgData name="François GLEYZON" userId="a2d04f23f7faf3ef" providerId="LiveId" clId="{1404D58C-429C-4D75-B5B2-E1C9B8E0DC36}" dt="2025-03-16T14:33:28.183" v="1132"/>
+          <ac:spMkLst>
+            <pc:docMk/>
+            <pc:sldMk cId="1403034857" sldId="274"/>
+            <ac:spMk id="11" creationId="{CC039125-0F68-3456-446E-4D9C7474E349}"/>
+          </ac:spMkLst>
+        </pc:spChg>
+        <pc:spChg chg="add mod">
+          <ac:chgData name="François GLEYZON" userId="a2d04f23f7faf3ef" providerId="LiveId" clId="{1404D58C-429C-4D75-B5B2-E1C9B8E0DC36}" dt="2025-03-16T18:23:52.809" v="6936" actId="113"/>
+          <ac:spMkLst>
+            <pc:docMk/>
+            <pc:sldMk cId="1403034857" sldId="274"/>
+            <ac:spMk id="13" creationId="{F42919BC-EA1A-4B98-6077-4001FBC5468F}"/>
+          </ac:spMkLst>
+        </pc:spChg>
+        <pc:picChg chg="add mod">
+          <ac:chgData name="François GLEYZON" userId="a2d04f23f7faf3ef" providerId="LiveId" clId="{1404D58C-429C-4D75-B5B2-E1C9B8E0DC36}" dt="2025-03-16T14:34:09.753" v="1139" actId="1076"/>
+          <ac:picMkLst>
+            <pc:docMk/>
+            <pc:sldMk cId="1403034857" sldId="274"/>
+            <ac:picMk id="3" creationId="{E01AC50A-D99A-D3E4-4BBB-CAE8C1141722}"/>
+          </ac:picMkLst>
+        </pc:picChg>
+        <pc:picChg chg="add mod">
+          <ac:chgData name="François GLEYZON" userId="a2d04f23f7faf3ef" providerId="LiveId" clId="{1404D58C-429C-4D75-B5B2-E1C9B8E0DC36}" dt="2025-03-16T14:41:10.123" v="2055" actId="1076"/>
+          <ac:picMkLst>
+            <pc:docMk/>
+            <pc:sldMk cId="1403034857" sldId="274"/>
+            <ac:picMk id="14" creationId="{6D57DE72-C86C-8864-4204-0A2213B42D38}"/>
+          </ac:picMkLst>
+        </pc:picChg>
+        <pc:picChg chg="add mod">
+          <ac:chgData name="François GLEYZON" userId="a2d04f23f7faf3ef" providerId="LiveId" clId="{1404D58C-429C-4D75-B5B2-E1C9B8E0DC36}" dt="2025-03-16T17:43:16.898" v="3942" actId="1076"/>
+          <ac:picMkLst>
+            <pc:docMk/>
+            <pc:sldMk cId="1403034857" sldId="274"/>
+            <ac:picMk id="1026" creationId="{C8CA877A-7DDE-FEB7-24D0-9EE0DFAC3ACC}"/>
+          </ac:picMkLst>
+        </pc:picChg>
+      </pc:sldChg>
+      <pc:sldChg chg="addSp delSp modSp add mod">
+        <pc:chgData name="François GLEYZON" userId="a2d04f23f7faf3ef" providerId="LiveId" clId="{1404D58C-429C-4D75-B5B2-E1C9B8E0DC36}" dt="2025-03-16T18:27:24.448" v="7125" actId="114"/>
+        <pc:sldMkLst>
+          <pc:docMk/>
+          <pc:sldMk cId="3135963873" sldId="275"/>
+        </pc:sldMkLst>
+        <pc:spChg chg="add mod">
+          <ac:chgData name="François GLEYZON" userId="a2d04f23f7faf3ef" providerId="LiveId" clId="{1404D58C-429C-4D75-B5B2-E1C9B8E0DC36}" dt="2025-03-16T18:27:24.448" v="7125" actId="114"/>
+          <ac:spMkLst>
+            <pc:docMk/>
+            <pc:sldMk cId="3135963873" sldId="275"/>
+            <ac:spMk id="5" creationId="{FAC551E2-7AD3-5FEF-E2DE-209EDBFB2695}"/>
+          </ac:spMkLst>
+        </pc:spChg>
+        <pc:spChg chg="mod">
+          <ac:chgData name="François GLEYZON" userId="a2d04f23f7faf3ef" providerId="LiveId" clId="{1404D58C-429C-4D75-B5B2-E1C9B8E0DC36}" dt="2025-03-16T15:23:02.888" v="3258" actId="20577"/>
+          <ac:spMkLst>
+            <pc:docMk/>
+            <pc:sldMk cId="3135963873" sldId="275"/>
+            <ac:spMk id="9" creationId="{A1BFB0DE-CCDE-5E15-B93D-0C46D50CF46E}"/>
+          </ac:spMkLst>
+        </pc:spChg>
+      </pc:sldChg>
+      <pc:sldChg chg="addSp delSp modSp add mod">
+        <pc:chgData name="François GLEYZON" userId="a2d04f23f7faf3ef" providerId="LiveId" clId="{1404D58C-429C-4D75-B5B2-E1C9B8E0DC36}" dt="2025-03-28T20:37:21.921" v="9093" actId="20577"/>
+        <pc:sldMkLst>
+          <pc:docMk/>
+          <pc:sldMk cId="312469821" sldId="276"/>
+        </pc:sldMkLst>
+        <pc:spChg chg="add mod">
+          <ac:chgData name="François GLEYZON" userId="a2d04f23f7faf3ef" providerId="LiveId" clId="{1404D58C-429C-4D75-B5B2-E1C9B8E0DC36}" dt="2025-03-27T20:54:15.974" v="7809" actId="1037"/>
+          <ac:spMkLst>
+            <pc:docMk/>
+            <pc:sldMk cId="312469821" sldId="276"/>
+            <ac:spMk id="3" creationId="{1E469B70-0A01-2F0B-8630-A75E636CB8E6}"/>
+          </ac:spMkLst>
+        </pc:spChg>
+        <pc:spChg chg="mod">
+          <ac:chgData name="François GLEYZON" userId="a2d04f23f7faf3ef" providerId="LiveId" clId="{1404D58C-429C-4D75-B5B2-E1C9B8E0DC36}" dt="2025-03-16T17:45:37.898" v="4201" actId="33524"/>
+          <ac:spMkLst>
+            <pc:docMk/>
+            <pc:sldMk cId="312469821" sldId="276"/>
+            <ac:spMk id="5" creationId="{D2931CAA-5B1D-3DB8-5405-0EBED6E73DDA}"/>
+          </ac:spMkLst>
+        </pc:spChg>
+        <pc:spChg chg="add mod">
+          <ac:chgData name="François GLEYZON" userId="a2d04f23f7faf3ef" providerId="LiveId" clId="{1404D58C-429C-4D75-B5B2-E1C9B8E0DC36}" dt="2025-03-28T20:37:21.921" v="9093" actId="20577"/>
+          <ac:spMkLst>
+            <pc:docMk/>
+            <pc:sldMk cId="312469821" sldId="276"/>
+            <ac:spMk id="8" creationId="{A3FB3464-F9D7-F388-8CA4-20C652C808AB}"/>
+          </ac:spMkLst>
+        </pc:spChg>
+        <pc:spChg chg="add mod">
+          <ac:chgData name="François GLEYZON" userId="a2d04f23f7faf3ef" providerId="LiveId" clId="{1404D58C-429C-4D75-B5B2-E1C9B8E0DC36}" dt="2025-03-16T18:24:53.792" v="6937" actId="1076"/>
+          <ac:spMkLst>
+            <pc:docMk/>
+            <pc:sldMk cId="312469821" sldId="276"/>
+            <ac:spMk id="10" creationId="{3787056C-9D45-21F4-6CDE-BB39E364A145}"/>
+          </ac:spMkLst>
+        </pc:spChg>
+        <pc:spChg chg="add mod">
+          <ac:chgData name="François GLEYZON" userId="a2d04f23f7faf3ef" providerId="LiveId" clId="{1404D58C-429C-4D75-B5B2-E1C9B8E0DC36}" dt="2025-03-16T18:25:24.592" v="6981" actId="114"/>
+          <ac:spMkLst>
+            <pc:docMk/>
+            <pc:sldMk cId="312469821" sldId="276"/>
+            <ac:spMk id="11" creationId="{9D58840C-50FD-E58B-670F-C4615DAF690D}"/>
+          </ac:spMkLst>
+        </pc:spChg>
+        <pc:picChg chg="add mod">
+          <ac:chgData name="François GLEYZON" userId="a2d04f23f7faf3ef" providerId="LiveId" clId="{1404D58C-429C-4D75-B5B2-E1C9B8E0DC36}" dt="2025-03-16T17:49:26.117" v="4766" actId="1076"/>
+          <ac:picMkLst>
+            <pc:docMk/>
+            <pc:sldMk cId="312469821" sldId="276"/>
+            <ac:picMk id="7" creationId="{4C33A69A-4ABB-390F-8D1C-5D58AB9AF2C3}"/>
+          </ac:picMkLst>
+        </pc:picChg>
+        <pc:picChg chg="add mod">
+          <ac:chgData name="François GLEYZON" userId="a2d04f23f7faf3ef" providerId="LiveId" clId="{1404D58C-429C-4D75-B5B2-E1C9B8E0DC36}" dt="2025-03-27T20:54:15.974" v="7809" actId="1037"/>
+          <ac:picMkLst>
+            <pc:docMk/>
+            <pc:sldMk cId="312469821" sldId="276"/>
+            <ac:picMk id="2050" creationId="{C26E7882-1A4B-4D9E-20C6-8D0DCC3535F1}"/>
+          </ac:picMkLst>
+        </pc:picChg>
+      </pc:sldChg>
+      <pc:sldChg chg="addSp delSp modSp add mod">
+        <pc:chgData name="François GLEYZON" userId="a2d04f23f7faf3ef" providerId="LiveId" clId="{1404D58C-429C-4D75-B5B2-E1C9B8E0DC36}" dt="2025-03-28T20:39:27.177" v="9100" actId="1035"/>
+        <pc:sldMkLst>
+          <pc:docMk/>
+          <pc:sldMk cId="1989661597" sldId="277"/>
+        </pc:sldMkLst>
+        <pc:spChg chg="add mod">
+          <ac:chgData name="François GLEYZON" userId="a2d04f23f7faf3ef" providerId="LiveId" clId="{1404D58C-429C-4D75-B5B2-E1C9B8E0DC36}" dt="2025-03-27T20:54:22.304" v="7810"/>
+          <ac:spMkLst>
+            <pc:docMk/>
+            <pc:sldMk cId="1989661597" sldId="277"/>
+            <ac:spMk id="4" creationId="{75AA8A51-2A97-8D06-CECD-B9BDC2716E90}"/>
+          </ac:spMkLst>
+        </pc:spChg>
+        <pc:spChg chg="mod">
+          <ac:chgData name="François GLEYZON" userId="a2d04f23f7faf3ef" providerId="LiveId" clId="{1404D58C-429C-4D75-B5B2-E1C9B8E0DC36}" dt="2025-03-16T18:25:42.620" v="6987" actId="6549"/>
+          <ac:spMkLst>
+            <pc:docMk/>
+            <pc:sldMk cId="1989661597" sldId="277"/>
+            <ac:spMk id="5" creationId="{4DAC8AF4-A004-7163-A739-49ECA39B9FEC}"/>
+          </ac:spMkLst>
+        </pc:spChg>
+        <pc:spChg chg="mod">
+          <ac:chgData name="François GLEYZON" userId="a2d04f23f7faf3ef" providerId="LiveId" clId="{1404D58C-429C-4D75-B5B2-E1C9B8E0DC36}" dt="2025-03-16T18:25:46.907" v="6988" actId="1076"/>
+          <ac:spMkLst>
+            <pc:docMk/>
+            <pc:sldMk cId="1989661597" sldId="277"/>
+            <ac:spMk id="10" creationId="{01A678EA-30F3-62CE-A9F0-10C182D4BBB2}"/>
+          </ac:spMkLst>
+        </pc:spChg>
+        <pc:spChg chg="add mod">
+          <ac:chgData name="François GLEYZON" userId="a2d04f23f7faf3ef" providerId="LiveId" clId="{1404D58C-429C-4D75-B5B2-E1C9B8E0DC36}" dt="2025-03-28T20:39:27.177" v="9100" actId="1035"/>
+          <ac:spMkLst>
+            <pc:docMk/>
+            <pc:sldMk cId="1989661597" sldId="277"/>
+            <ac:spMk id="12" creationId="{AFD64144-DA5F-8B73-6CEA-181D47AD5646}"/>
+          </ac:spMkLst>
+        </pc:spChg>
+        <pc:spChg chg="add mod">
+          <ac:chgData name="François GLEYZON" userId="a2d04f23f7faf3ef" providerId="LiveId" clId="{1404D58C-429C-4D75-B5B2-E1C9B8E0DC36}" dt="2025-03-16T18:25:52.377" v="6990" actId="1076"/>
+          <ac:spMkLst>
+            <pc:docMk/>
+            <pc:sldMk cId="1989661597" sldId="277"/>
+            <ac:spMk id="13" creationId="{C4557F9C-855D-3055-9D46-7013C9868120}"/>
+          </ac:spMkLst>
+        </pc:spChg>
+        <pc:picChg chg="add del mod">
+          <ac:chgData name="François GLEYZON" userId="a2d04f23f7faf3ef" providerId="LiveId" clId="{1404D58C-429C-4D75-B5B2-E1C9B8E0DC36}" dt="2025-03-28T20:35:42.567" v="8998" actId="478"/>
+          <ac:picMkLst>
+            <pc:docMk/>
+            <pc:sldMk cId="1989661597" sldId="277"/>
+            <ac:picMk id="3" creationId="{9418A06D-5188-6FDC-24BC-F87439036057}"/>
+          </ac:picMkLst>
+        </pc:picChg>
+        <pc:picChg chg="add mod">
+          <ac:chgData name="François GLEYZON" userId="a2d04f23f7faf3ef" providerId="LiveId" clId="{1404D58C-429C-4D75-B5B2-E1C9B8E0DC36}" dt="2025-03-28T20:35:48.044" v="8999"/>
+          <ac:picMkLst>
+            <pc:docMk/>
+            <pc:sldMk cId="1989661597" sldId="277"/>
+            <ac:picMk id="6" creationId="{538B70F3-BB9F-2E3D-160E-BF782BAAAFD2}"/>
+          </ac:picMkLst>
+        </pc:picChg>
+        <pc:picChg chg="add mod">
+          <ac:chgData name="François GLEYZON" userId="a2d04f23f7faf3ef" providerId="LiveId" clId="{1404D58C-429C-4D75-B5B2-E1C9B8E0DC36}" dt="2025-03-16T18:25:48.590" v="6989" actId="1076"/>
+          <ac:picMkLst>
+            <pc:docMk/>
+            <pc:sldMk cId="1989661597" sldId="277"/>
+            <ac:picMk id="11" creationId="{76E36435-5B32-C3F8-CDBC-02E2B5086320}"/>
+          </ac:picMkLst>
+        </pc:picChg>
+      </pc:sldChg>
+      <pc:sldChg chg="addSp delSp modSp add mod">
+        <pc:chgData name="François GLEYZON" userId="a2d04f23f7faf3ef" providerId="LiveId" clId="{1404D58C-429C-4D75-B5B2-E1C9B8E0DC36}" dt="2025-03-28T20:36:42.950" v="9002" actId="20577"/>
+        <pc:sldMkLst>
+          <pc:docMk/>
+          <pc:sldMk cId="3353157011" sldId="278"/>
+        </pc:sldMkLst>
+        <pc:spChg chg="add mod">
+          <ac:chgData name="François GLEYZON" userId="a2d04f23f7faf3ef" providerId="LiveId" clId="{1404D58C-429C-4D75-B5B2-E1C9B8E0DC36}" dt="2025-03-16T18:20:16.267" v="6837" actId="207"/>
+          <ac:spMkLst>
+            <pc:docMk/>
+            <pc:sldMk cId="3353157011" sldId="278"/>
+            <ac:spMk id="3" creationId="{9B7F5462-4ABB-EBA2-0610-D1DC1488F1E8}"/>
+          </ac:spMkLst>
+        </pc:spChg>
+        <pc:spChg chg="add mod">
+          <ac:chgData name="François GLEYZON" userId="a2d04f23f7faf3ef" providerId="LiveId" clId="{1404D58C-429C-4D75-B5B2-E1C9B8E0DC36}" dt="2025-03-28T20:36:42.950" v="9002" actId="20577"/>
+          <ac:spMkLst>
+            <pc:docMk/>
+            <pc:sldMk cId="3353157011" sldId="278"/>
+            <ac:spMk id="4" creationId="{071085C4-0B93-7C4D-668E-440636B813C4}"/>
+          </ac:spMkLst>
+        </pc:spChg>
+        <pc:spChg chg="mod">
+          <ac:chgData name="François GLEYZON" userId="a2d04f23f7faf3ef" providerId="LiveId" clId="{1404D58C-429C-4D75-B5B2-E1C9B8E0DC36}" dt="2025-03-18T00:13:16.107" v="7136" actId="13926"/>
+          <ac:spMkLst>
+            <pc:docMk/>
+            <pc:sldMk cId="3353157011" sldId="278"/>
+            <ac:spMk id="5" creationId="{123C1752-9749-D963-C34A-A3CB069DD9C5}"/>
+          </ac:spMkLst>
+        </pc:spChg>
+      </pc:sldChg>
+      <pc:sldChg chg="add">
+        <pc:chgData name="François GLEYZON" userId="a2d04f23f7faf3ef" providerId="LiveId" clId="{1404D58C-429C-4D75-B5B2-E1C9B8E0DC36}" dt="2025-03-27T15:48:09.571" v="7435"/>
+        <pc:sldMkLst>
+          <pc:docMk/>
+          <pc:sldMk cId="963883029" sldId="279"/>
+        </pc:sldMkLst>
+      </pc:sldChg>
+      <pc:sldChg chg="addSp delSp modSp add mod">
+        <pc:chgData name="François GLEYZON" userId="a2d04f23f7faf3ef" providerId="LiveId" clId="{1404D58C-429C-4D75-B5B2-E1C9B8E0DC36}" dt="2025-03-28T20:40:04.072" v="9111" actId="20577"/>
+        <pc:sldMkLst>
+          <pc:docMk/>
+          <pc:sldMk cId="956691911" sldId="280"/>
+        </pc:sldMkLst>
+        <pc:spChg chg="mod">
+          <ac:chgData name="François GLEYZON" userId="a2d04f23f7faf3ef" providerId="LiveId" clId="{1404D58C-429C-4D75-B5B2-E1C9B8E0DC36}" dt="2025-03-27T21:06:48.929" v="8549" actId="114"/>
+          <ac:spMkLst>
+            <pc:docMk/>
+            <pc:sldMk cId="956691911" sldId="280"/>
+            <ac:spMk id="3" creationId="{49E817FD-6192-C972-9162-7F57B3CE3D00}"/>
+          </ac:spMkLst>
+        </pc:spChg>
+        <pc:spChg chg="del">
+          <ac:chgData name="François GLEYZON" userId="a2d04f23f7faf3ef" providerId="LiveId" clId="{1404D58C-429C-4D75-B5B2-E1C9B8E0DC36}" dt="2025-03-27T21:05:37.824" v="8495" actId="478"/>
+          <ac:spMkLst>
+            <pc:docMk/>
+            <pc:sldMk cId="956691911" sldId="280"/>
+            <ac:spMk id="13" creationId="{30FD23D6-F439-5EE3-0133-24669F1EF0A4}"/>
+          </ac:spMkLst>
+        </pc:spChg>
+        <pc:spChg chg="add mod">
+          <ac:chgData name="François GLEYZON" userId="a2d04f23f7faf3ef" providerId="LiveId" clId="{1404D58C-429C-4D75-B5B2-E1C9B8E0DC36}" dt="2025-03-28T20:40:04.072" v="9111" actId="20577"/>
+          <ac:spMkLst>
+            <pc:docMk/>
+            <pc:sldMk cId="956691911" sldId="280"/>
+            <ac:spMk id="14" creationId="{15BE0636-0290-4D62-2BBD-81087B277E96}"/>
+          </ac:spMkLst>
+        </pc:spChg>
+        <pc:spChg chg="add del mod">
+          <ac:chgData name="François GLEYZON" userId="a2d04f23f7faf3ef" providerId="LiveId" clId="{1404D58C-429C-4D75-B5B2-E1C9B8E0DC36}" dt="2025-03-27T21:11:48.167" v="8891" actId="478"/>
+          <ac:spMkLst>
+            <pc:docMk/>
+            <pc:sldMk cId="956691911" sldId="280"/>
+            <ac:spMk id="16" creationId="{DF78B8ED-CA81-7442-722A-9100B46FFC0F}"/>
+          </ac:spMkLst>
+        </pc:spChg>
+        <pc:spChg chg="add del mod">
+          <ac:chgData name="François GLEYZON" userId="a2d04f23f7faf3ef" providerId="LiveId" clId="{1404D58C-429C-4D75-B5B2-E1C9B8E0DC36}" dt="2025-03-27T21:11:00.101" v="8865"/>
+          <ac:spMkLst>
+            <pc:docMk/>
+            <pc:sldMk cId="956691911" sldId="280"/>
+            <ac:spMk id="17" creationId="{DA909163-8B12-2698-D0BA-A5A3E3CFC4D8}"/>
+          </ac:spMkLst>
+        </pc:spChg>
+        <pc:spChg chg="add mod">
+          <ac:chgData name="François GLEYZON" userId="a2d04f23f7faf3ef" providerId="LiveId" clId="{1404D58C-429C-4D75-B5B2-E1C9B8E0DC36}" dt="2025-03-27T21:12:00.599" v="8896" actId="1036"/>
+          <ac:spMkLst>
+            <pc:docMk/>
+            <pc:sldMk cId="956691911" sldId="280"/>
+            <ac:spMk id="18" creationId="{0B9EC4DF-BFB4-7E6C-E9F3-26663D2EEE7E}"/>
+          </ac:spMkLst>
+        </pc:spChg>
+        <pc:picChg chg="del">
+          <ac:chgData name="François GLEYZON" userId="a2d04f23f7faf3ef" providerId="LiveId" clId="{1404D58C-429C-4D75-B5B2-E1C9B8E0DC36}" dt="2025-03-27T21:05:35.780" v="8493" actId="478"/>
+          <ac:picMkLst>
+            <pc:docMk/>
+            <pc:sldMk cId="956691911" sldId="280"/>
+            <ac:picMk id="7" creationId="{D6A04802-FD94-CCF6-E27E-B6CC2EE0B512}"/>
+          </ac:picMkLst>
+        </pc:picChg>
+        <pc:picChg chg="add mod">
+          <ac:chgData name="François GLEYZON" userId="a2d04f23f7faf3ef" providerId="LiveId" clId="{1404D58C-429C-4D75-B5B2-E1C9B8E0DC36}" dt="2025-03-27T21:11:50.374" v="8893" actId="1076"/>
+          <ac:picMkLst>
+            <pc:docMk/>
+            <pc:sldMk cId="956691911" sldId="280"/>
+            <ac:picMk id="8" creationId="{443D6940-4B4A-542A-BA6C-963F392DDFE4}"/>
+          </ac:picMkLst>
+        </pc:picChg>
+        <pc:picChg chg="del">
+          <ac:chgData name="François GLEYZON" userId="a2d04f23f7faf3ef" providerId="LiveId" clId="{1404D58C-429C-4D75-B5B2-E1C9B8E0DC36}" dt="2025-03-27T21:05:36.341" v="8494" actId="478"/>
+          <ac:picMkLst>
+            <pc:docMk/>
+            <pc:sldMk cId="956691911" sldId="280"/>
+            <ac:picMk id="10" creationId="{8570CB32-03D9-F400-9EEA-BD3656F09699}"/>
+          </ac:picMkLst>
+        </pc:picChg>
+        <pc:picChg chg="add mod">
+          <ac:chgData name="François GLEYZON" userId="a2d04f23f7faf3ef" providerId="LiveId" clId="{1404D58C-429C-4D75-B5B2-E1C9B8E0DC36}" dt="2025-03-27T21:06:13.652" v="8508" actId="1076"/>
+          <ac:picMkLst>
+            <pc:docMk/>
+            <pc:sldMk cId="956691911" sldId="280"/>
+            <ac:picMk id="12" creationId="{5FD27660-F829-9650-A7F7-56552FB1EB07}"/>
+          </ac:picMkLst>
+        </pc:picChg>
+      </pc:sldChg>
+      <pc:sldChg chg="addSp delSp modSp mod">
+        <pc:chgData name="François GLEYZON" userId="a2d04f23f7faf3ef" providerId="LiveId" clId="{1404D58C-429C-4D75-B5B2-E1C9B8E0DC36}" dt="2025-03-28T20:39:29.615" v="9101"/>
+        <pc:sldMkLst>
+          <pc:docMk/>
+          <pc:sldMk cId="1526862644" sldId="281"/>
+        </pc:sldMkLst>
+        <pc:spChg chg="add mod">
+          <ac:chgData name="François GLEYZON" userId="a2d04f23f7faf3ef" providerId="LiveId" clId="{1404D58C-429C-4D75-B5B2-E1C9B8E0DC36}" dt="2025-03-28T20:39:29.615" v="9101"/>
+          <ac:spMkLst>
+            <pc:docMk/>
+            <pc:sldMk cId="1526862644" sldId="281"/>
+            <ac:spMk id="2" creationId="{5966144F-B588-EB7A-8301-CB38AB051710}"/>
+          </ac:spMkLst>
+        </pc:spChg>
+        <pc:spChg chg="mod">
+          <ac:chgData name="François GLEYZON" userId="a2d04f23f7faf3ef" providerId="LiveId" clId="{1404D58C-429C-4D75-B5B2-E1C9B8E0DC36}" dt="2025-03-28T20:39:06.835" v="9095"/>
+          <ac:spMkLst>
+            <pc:docMk/>
+            <pc:sldMk cId="1526862644" sldId="281"/>
+            <ac:spMk id="5" creationId="{309D56B0-990D-A3FC-9388-987F015973E1}"/>
+          </ac:spMkLst>
+        </pc:spChg>
+        <pc:spChg chg="del">
+          <ac:chgData name="François GLEYZON" userId="a2d04f23f7faf3ef" providerId="LiveId" clId="{1404D58C-429C-4D75-B5B2-E1C9B8E0DC36}" dt="2025-03-28T20:39:22.007" v="9098" actId="478"/>
+          <ac:spMkLst>
+            <pc:docMk/>
+            <pc:sldMk cId="1526862644" sldId="281"/>
+            <ac:spMk id="6" creationId="{3956B676-E09A-819D-5A1C-CC4FD9C9ABCC}"/>
+          </ac:spMkLst>
+        </pc:spChg>
+        <pc:picChg chg="add mod">
+          <ac:chgData name="François GLEYZON" userId="a2d04f23f7faf3ef" providerId="LiveId" clId="{1404D58C-429C-4D75-B5B2-E1C9B8E0DC36}" dt="2025-03-28T20:39:15.483" v="9097" actId="1076"/>
+          <ac:picMkLst>
+            <pc:docMk/>
+            <pc:sldMk cId="1526862644" sldId="281"/>
+            <ac:picMk id="1026" creationId="{71CF4118-EFA3-D084-25BB-B63BD69C144B}"/>
+          </ac:picMkLst>
+        </pc:picChg>
+      </pc:sldChg>
+    </pc:docChg>
+  </pc:docChgLst>
 </pc:chgInfo>
 </file>
 
@@ -2475,7 +2522,7 @@
           <a:p>
             <a:fld id="{536D1BE0-9163-4941-8556-7FE0B29195A4}" type="datetimeFigureOut">
               <a:rPr lang="en-GB" smtClean="0"/>
-              <a:t>27/03/2025</a:t>
+              <a:t>28/03/2025</a:t>
             </a:fld>
             <a:endParaRPr lang="en-GB"/>
           </a:p>
@@ -3168,7 +3215,7 @@
           <a:p>
             <a:fld id="{CEFDEF93-0E3A-4A89-BC16-F38BAE82060D}" type="datetimeFigureOut">
               <a:rPr lang="en-GB" smtClean="0"/>
-              <a:t>27/03/2025</a:t>
+              <a:t>28/03/2025</a:t>
             </a:fld>
             <a:endParaRPr lang="en-GB"/>
           </a:p>
@@ -3368,7 +3415,7 @@
           <a:p>
             <a:fld id="{CEFDEF93-0E3A-4A89-BC16-F38BAE82060D}" type="datetimeFigureOut">
               <a:rPr lang="en-GB" smtClean="0"/>
-              <a:t>27/03/2025</a:t>
+              <a:t>28/03/2025</a:t>
             </a:fld>
             <a:endParaRPr lang="en-GB"/>
           </a:p>
@@ -3578,7 +3625,7 @@
           <a:p>
             <a:fld id="{CEFDEF93-0E3A-4A89-BC16-F38BAE82060D}" type="datetimeFigureOut">
               <a:rPr lang="en-GB" smtClean="0"/>
-              <a:t>27/03/2025</a:t>
+              <a:t>28/03/2025</a:t>
             </a:fld>
             <a:endParaRPr lang="en-GB"/>
           </a:p>
@@ -3778,7 +3825,7 @@
           <a:p>
             <a:fld id="{CEFDEF93-0E3A-4A89-BC16-F38BAE82060D}" type="datetimeFigureOut">
               <a:rPr lang="en-GB" smtClean="0"/>
-              <a:t>27/03/2025</a:t>
+              <a:t>28/03/2025</a:t>
             </a:fld>
             <a:endParaRPr lang="en-GB"/>
           </a:p>
@@ -4054,7 +4101,7 @@
           <a:p>
             <a:fld id="{CEFDEF93-0E3A-4A89-BC16-F38BAE82060D}" type="datetimeFigureOut">
               <a:rPr lang="en-GB" smtClean="0"/>
-              <a:t>27/03/2025</a:t>
+              <a:t>28/03/2025</a:t>
             </a:fld>
             <a:endParaRPr lang="en-GB"/>
           </a:p>
@@ -4322,7 +4369,7 @@
           <a:p>
             <a:fld id="{CEFDEF93-0E3A-4A89-BC16-F38BAE82060D}" type="datetimeFigureOut">
               <a:rPr lang="en-GB" smtClean="0"/>
-              <a:t>27/03/2025</a:t>
+              <a:t>28/03/2025</a:t>
             </a:fld>
             <a:endParaRPr lang="en-GB"/>
           </a:p>
@@ -4737,7 +4784,7 @@
           <a:p>
             <a:fld id="{CEFDEF93-0E3A-4A89-BC16-F38BAE82060D}" type="datetimeFigureOut">
               <a:rPr lang="en-GB" smtClean="0"/>
-              <a:t>27/03/2025</a:t>
+              <a:t>28/03/2025</a:t>
             </a:fld>
             <a:endParaRPr lang="en-GB"/>
           </a:p>
@@ -4879,7 +4926,7 @@
           <a:p>
             <a:fld id="{CEFDEF93-0E3A-4A89-BC16-F38BAE82060D}" type="datetimeFigureOut">
               <a:rPr lang="en-GB" smtClean="0"/>
-              <a:t>27/03/2025</a:t>
+              <a:t>28/03/2025</a:t>
             </a:fld>
             <a:endParaRPr lang="en-GB"/>
           </a:p>
@@ -4992,7 +5039,7 @@
           <a:p>
             <a:fld id="{CEFDEF93-0E3A-4A89-BC16-F38BAE82060D}" type="datetimeFigureOut">
               <a:rPr lang="en-GB" smtClean="0"/>
-              <a:t>27/03/2025</a:t>
+              <a:t>28/03/2025</a:t>
             </a:fld>
             <a:endParaRPr lang="en-GB"/>
           </a:p>
@@ -5305,7 +5352,7 @@
           <a:p>
             <a:fld id="{CEFDEF93-0E3A-4A89-BC16-F38BAE82060D}" type="datetimeFigureOut">
               <a:rPr lang="en-GB" smtClean="0"/>
-              <a:t>27/03/2025</a:t>
+              <a:t>28/03/2025</a:t>
             </a:fld>
             <a:endParaRPr lang="en-GB"/>
           </a:p>
@@ -5594,7 +5641,7 @@
           <a:p>
             <a:fld id="{CEFDEF93-0E3A-4A89-BC16-F38BAE82060D}" type="datetimeFigureOut">
               <a:rPr lang="en-GB" smtClean="0"/>
-              <a:t>27/03/2025</a:t>
+              <a:t>28/03/2025</a:t>
             </a:fld>
             <a:endParaRPr lang="en-GB"/>
           </a:p>
@@ -5837,7 +5884,7 @@
           <a:p>
             <a:fld id="{CEFDEF93-0E3A-4A89-BC16-F38BAE82060D}" type="datetimeFigureOut">
               <a:rPr lang="en-GB" smtClean="0"/>
-              <a:t>27/03/2025</a:t>
+              <a:t>28/03/2025</a:t>
             </a:fld>
             <a:endParaRPr lang="en-GB"/>
           </a:p>
@@ -7045,8 +7092,8 @@
           </a:p>
         </p:txBody>
       </p:sp>
-      <mc:AlternateContent xmlns:mc="http://schemas.openxmlformats.org/markup-compatibility/2006" xmlns:a14="http://schemas.microsoft.com/office/drawing/2010/main">
-        <mc:Choice Requires="a14">
+      <mc:AlternateContent xmlns:mc="http://schemas.openxmlformats.org/markup-compatibility/2006">
+        <mc:Choice xmlns:a14="http://schemas.microsoft.com/office/drawing/2010/main" Requires="a14">
           <p:sp>
             <p:nvSpPr>
               <p:cNvPr id="5" name="TextBox 4">
@@ -7062,7 +7109,7 @@
             <p:spPr>
               <a:xfrm>
                 <a:off x="0" y="1046772"/>
-                <a:ext cx="12192000" cy="5355312"/>
+                <a:ext cx="12192000" cy="5078313"/>
               </a:xfrm>
               <a:prstGeom prst="rect">
                 <a:avLst/>
@@ -7079,7 +7126,10 @@
                   <a:buNone/>
                 </a:pPr>
                 <a:r>
-                  <a:rPr lang="fr-FR" u="sng" dirty="0"/>
+                  <a:rPr lang="fr-FR" u="sng" dirty="0">
+                    <a:latin typeface="Times New Roman" panose="02020603050405020304" pitchFamily="18" charset="0"/>
+                    <a:cs typeface="Times New Roman" panose="02020603050405020304" pitchFamily="18" charset="0"/>
+                  </a:rPr>
                   <a:t>D’où vient le plateau sur la SRQ ?</a:t>
                 </a:r>
               </a:p>
@@ -7089,7 +7139,10 @@
                   <a:buChar char="•"/>
                 </a:pPr>
                 <a:r>
-                  <a:rPr lang="fr-FR" dirty="0"/>
+                  <a:rPr lang="fr-FR" dirty="0">
+                    <a:latin typeface="Times New Roman" panose="02020603050405020304" pitchFamily="18" charset="0"/>
+                    <a:cs typeface="Times New Roman" panose="02020603050405020304" pitchFamily="18" charset="0"/>
+                  </a:rPr>
                   <a:t>Convergence numérique</a:t>
                 </a:r>
               </a:p>
@@ -7099,7 +7152,10 @@
                   <a:buChar char="•"/>
                 </a:pPr>
                 <a:r>
-                  <a:rPr lang="fr-FR" dirty="0"/>
+                  <a:rPr lang="fr-FR" dirty="0">
+                    <a:latin typeface="Times New Roman" panose="02020603050405020304" pitchFamily="18" charset="0"/>
+                    <a:cs typeface="Times New Roman" panose="02020603050405020304" pitchFamily="18" charset="0"/>
+                  </a:rPr>
                   <a:t>Une fois un certain seuil atteint, l’erreur de discrétisation devient négligeable.</a:t>
                 </a:r>
               </a:p>
@@ -7109,7 +7165,10 @@
                   <a:buChar char="•"/>
                 </a:pPr>
                 <a:r>
-                  <a:rPr lang="fr-FR" dirty="0"/>
+                  <a:rPr lang="fr-FR" dirty="0">
+                    <a:latin typeface="Times New Roman" panose="02020603050405020304" pitchFamily="18" charset="0"/>
+                    <a:cs typeface="Times New Roman" panose="02020603050405020304" pitchFamily="18" charset="0"/>
+                  </a:rPr>
                   <a:t>Limite physique</a:t>
                 </a:r>
               </a:p>
@@ -7119,7 +7178,10 @@
                   <a:buChar char="•"/>
                 </a:pPr>
                 <a:r>
-                  <a:rPr lang="fr-FR" dirty="0"/>
+                  <a:rPr lang="fr-FR" dirty="0">
+                    <a:latin typeface="Times New Roman" panose="02020603050405020304" pitchFamily="18" charset="0"/>
+                    <a:cs typeface="Times New Roman" panose="02020603050405020304" pitchFamily="18" charset="0"/>
+                  </a:rPr>
                   <a:t>En grandes déformations, l’influence d’un maillage plus fin sur la réponse globale diminue progressivement.</a:t>
                 </a:r>
               </a:p>
@@ -7129,7 +7191,10 @@
                   <a:buChar char="•"/>
                 </a:pPr>
                 <a:r>
-                  <a:rPr lang="fr-FR" dirty="0"/>
+                  <a:rPr lang="fr-FR" dirty="0">
+                    <a:latin typeface="Times New Roman" panose="02020603050405020304" pitchFamily="18" charset="0"/>
+                    <a:cs typeface="Times New Roman" panose="02020603050405020304" pitchFamily="18" charset="0"/>
+                  </a:rPr>
                   <a:t>Erreurs numériques et limites logicielles</a:t>
                 </a:r>
               </a:p>
@@ -7139,7 +7204,10 @@
                   <a:buChar char="•"/>
                 </a:pPr>
                 <a:r>
-                  <a:rPr lang="fr-FR" dirty="0"/>
+                  <a:rPr lang="fr-FR" dirty="0">
+                    <a:latin typeface="Times New Roman" panose="02020603050405020304" pitchFamily="18" charset="0"/>
+                    <a:cs typeface="Times New Roman" panose="02020603050405020304" pitchFamily="18" charset="0"/>
+                  </a:rPr>
                   <a:t>Précision machine : les erreurs itératives peuvent prendre le dessus sur l’erreur de discrétisation.</a:t>
                 </a:r>
               </a:p>
@@ -7149,7 +7217,10 @@
                   <a:buChar char="•"/>
                 </a:pPr>
                 <a:r>
-                  <a:rPr lang="fr-FR" dirty="0"/>
+                  <a:rPr lang="fr-FR" dirty="0">
+                    <a:latin typeface="Times New Roman" panose="02020603050405020304" pitchFamily="18" charset="0"/>
+                    <a:cs typeface="Times New Roman" panose="02020603050405020304" pitchFamily="18" charset="0"/>
+                  </a:rPr>
                   <a:t>Version étudiante d’Ansys : restriction sur le nombre de nœuds, impossible de confirmer l’étendue du plateau.</a:t>
                 </a:r>
               </a:p>
@@ -7158,17 +7229,26 @@
                   <a:buFont typeface="Arial" panose="020B0604020202020204" pitchFamily="34" charset="0"/>
                   <a:buChar char="•"/>
                 </a:pPr>
-                <a:endParaRPr lang="fr-FR" dirty="0"/>
+                <a:endParaRPr lang="fr-FR" dirty="0">
+                  <a:latin typeface="Times New Roman" panose="02020603050405020304" pitchFamily="18" charset="0"/>
+                  <a:cs typeface="Times New Roman" panose="02020603050405020304" pitchFamily="18" charset="0"/>
+                </a:endParaRPr>
               </a:p>
               <a:p>
                 <a:r>
-                  <a:rPr lang="fr-FR" u="sng" dirty="0"/>
+                  <a:rPr lang="fr-FR" u="sng" dirty="0">
+                    <a:latin typeface="Times New Roman" panose="02020603050405020304" pitchFamily="18" charset="0"/>
+                    <a:cs typeface="Times New Roman" panose="02020603050405020304" pitchFamily="18" charset="0"/>
+                  </a:rPr>
                   <a:t>Pourquoi l’ordre de convergence observé n’est pas égal à l’ordre de convergence formel ?</a:t>
                 </a:r>
               </a:p>
               <a:p>
                 <a:r>
-                  <a:rPr lang="fr-FR" dirty="0"/>
+                  <a:rPr lang="fr-FR" dirty="0">
+                    <a:latin typeface="Times New Roman" panose="02020603050405020304" pitchFamily="18" charset="0"/>
+                    <a:cs typeface="Times New Roman" panose="02020603050405020304" pitchFamily="18" charset="0"/>
+                  </a:rPr>
                   <a:t>La convergence du modèle est dégradée. </a:t>
                 </a:r>
               </a:p>
@@ -7178,7 +7258,10 @@
                   <a:buChar char="•"/>
                 </a:pPr>
                 <a:r>
-                  <a:rPr lang="fr-FR" dirty="0"/>
+                  <a:rPr lang="fr-FR" dirty="0">
+                    <a:latin typeface="Times New Roman" panose="02020603050405020304" pitchFamily="18" charset="0"/>
+                    <a:cs typeface="Times New Roman" panose="02020603050405020304" pitchFamily="18" charset="0"/>
+                  </a:rPr>
                   <a:t>Si les conditions aux limites sont mal capturées par le maillage, elles peuvent induire des erreurs locales qui ralentissent la convergence.</a:t>
                 </a:r>
               </a:p>
@@ -7188,7 +7271,10 @@
                   <a:buChar char="•"/>
                 </a:pPr>
                 <a:r>
-                  <a:rPr lang="fr-FR" dirty="0"/>
+                  <a:rPr lang="fr-FR" dirty="0">
+                    <a:latin typeface="Times New Roman" panose="02020603050405020304" pitchFamily="18" charset="0"/>
+                    <a:cs typeface="Times New Roman" panose="02020603050405020304" pitchFamily="18" charset="0"/>
+                  </a:rPr>
                   <a:t>Si la zone où </a:t>
                 </a:r>
                 <a14:m>
@@ -7221,7 +7307,10 @@
                   </m:oMath>
                 </a14:m>
                 <a:r>
-                  <a:rPr lang="fr-FR" dirty="0"/>
+                  <a:rPr lang="fr-FR" dirty="0">
+                    <a:latin typeface="Times New Roman" panose="02020603050405020304" pitchFamily="18" charset="0"/>
+                    <a:cs typeface="Times New Roman" panose="02020603050405020304" pitchFamily="18" charset="0"/>
+                  </a:rPr>
                   <a:t>​ se produit est mal maillée, elle peut dominer l’erreur globale.</a:t>
                 </a:r>
               </a:p>
@@ -7231,7 +7320,10 @@
                   <a:buChar char="•"/>
                 </a:pPr>
                 <a:r>
-                  <a:rPr lang="fr-FR" dirty="0"/>
+                  <a:rPr lang="fr-FR" dirty="0">
+                    <a:latin typeface="Times New Roman" panose="02020603050405020304" pitchFamily="18" charset="0"/>
+                    <a:cs typeface="Times New Roman" panose="02020603050405020304" pitchFamily="18" charset="0"/>
+                  </a:rPr>
                   <a:t>Si les contraintes appliquées sont trop localisées (ex : un point de contact), la convergence peut être plus lente qu’attendu. Dans notre cas, les conditions aux limites sont appliquées sur les extrémités de l’orthèse. Les appliquer de manière plus réaliste avec surface d’application plus grande aurait pu aider à conserver la convergence du modèle à 3. </a:t>
                 </a:r>
               </a:p>
@@ -7240,12 +7332,15 @@
                   <a:buFont typeface="Arial" panose="020B0604020202020204" pitchFamily="34" charset="0"/>
                   <a:buChar char="•"/>
                 </a:pPr>
-                <a:endParaRPr lang="fr-FR" dirty="0"/>
+                <a:endParaRPr lang="fr-FR" dirty="0">
+                  <a:latin typeface="Times New Roman" panose="02020603050405020304" pitchFamily="18" charset="0"/>
+                  <a:cs typeface="Times New Roman" panose="02020603050405020304" pitchFamily="18" charset="0"/>
+                </a:endParaRPr>
               </a:p>
             </p:txBody>
           </p:sp>
         </mc:Choice>
-        <mc:Fallback xmlns="">
+        <mc:Fallback>
           <p:sp>
             <p:nvSpPr>
               <p:cNvPr id="5" name="TextBox 4">
@@ -7263,7 +7358,7 @@
             <p:spPr>
               <a:xfrm>
                 <a:off x="0" y="1046772"/>
-                <a:ext cx="12192000" cy="5355312"/>
+                <a:ext cx="12192000" cy="5078313"/>
               </a:xfrm>
               <a:prstGeom prst="rect">
                 <a:avLst/>
@@ -7271,7 +7366,7 @@
               <a:blipFill>
                 <a:blip r:embed="rId2"/>
                 <a:stretch>
-                  <a:fillRect l="-400" t="-569"/>
+                  <a:fillRect l="-400" t="-720"/>
                 </a:stretch>
               </a:blipFill>
             </p:spPr>
@@ -7280,7 +7375,7 @@
               <a:lstStyle/>
               <a:p>
                 <a:r>
-                  <a:rPr lang="fr-FR">
+                  <a:rPr lang="en-GB">
                     <a:noFill/>
                   </a:rPr>
                   <a:t> </a:t>
@@ -7336,32 +7431,89 @@
           </a:p>
         </p:txBody>
       </p:sp>
-      <p:sp>
-        <p:nvSpPr>
-          <p:cNvPr id="6" name="Slide Number Placeholder 5">
+      <p:pic>
+        <p:nvPicPr>
+          <p:cNvPr id="1026" name="Picture 2" descr="Idea Special Lineal color icon">
             <a:extLst>
               <a:ext uri="{FF2B5EF4-FFF2-40B4-BE49-F238E27FC236}">
-                <a16:creationId xmlns:a16="http://schemas.microsoft.com/office/drawing/2014/main" id="{3956B676-E09A-819D-5A1C-CC4FD9C9ABCC}"/>
+                <a16:creationId xmlns:a16="http://schemas.microsoft.com/office/drawing/2014/main" id="{71CF4118-EFA3-D084-25BB-B63BD69C144B}"/>
               </a:ext>
             </a:extLst>
           </p:cNvPr>
-          <p:cNvSpPr>
-            <a:spLocks noGrp="1"/>
-          </p:cNvSpPr>
-          <p:nvPr>
-            <p:ph type="sldNum" sz="quarter" idx="12"/>
-          </p:nvPr>
+          <p:cNvPicPr>
+            <a:picLocks noChangeAspect="1" noChangeArrowheads="1"/>
+          </p:cNvPicPr>
+          <p:nvPr/>
+        </p:nvPicPr>
+        <p:blipFill>
+          <a:blip r:embed="rId3">
+            <a:extLst>
+              <a:ext uri="{28A0092B-C50C-407E-A947-70E740481C1C}">
+                <a14:useLocalDpi xmlns:a14="http://schemas.microsoft.com/office/drawing/2010/main" val="0"/>
+              </a:ext>
+            </a:extLst>
+          </a:blip>
+          <a:srcRect/>
+          <a:stretch>
+            <a:fillRect/>
+          </a:stretch>
+        </p:blipFill>
+        <p:spPr bwMode="auto">
+          <a:xfrm>
+            <a:off x="11353800" y="607974"/>
+            <a:ext cx="646332" cy="646332"/>
+          </a:xfrm>
+          <a:prstGeom prst="rect">
+            <a:avLst/>
+          </a:prstGeom>
+          <a:noFill/>
+          <a:extLst>
+            <a:ext uri="{909E8E84-426E-40DD-AFC4-6F175D3DCCD1}">
+              <a14:hiddenFill xmlns:a14="http://schemas.microsoft.com/office/drawing/2010/main">
+                <a:solidFill>
+                  <a:srgbClr val="FFFFFF"/>
+                </a:solidFill>
+              </a14:hiddenFill>
+            </a:ext>
+          </a:extLst>
+        </p:spPr>
+      </p:pic>
+      <p:sp>
+        <p:nvSpPr>
+          <p:cNvPr id="2" name="TextBox 1">
+            <a:extLst>
+              <a:ext uri="{FF2B5EF4-FFF2-40B4-BE49-F238E27FC236}">
+                <a16:creationId xmlns:a16="http://schemas.microsoft.com/office/drawing/2014/main" id="{5966144F-B588-EB7A-8301-CB38AB051710}"/>
+              </a:ext>
+            </a:extLst>
+          </p:cNvPr>
+          <p:cNvSpPr txBox="1"/>
+          <p:nvPr/>
         </p:nvSpPr>
-        <p:spPr/>
+        <p:spPr>
+          <a:xfrm>
+            <a:off x="11091333" y="6550222"/>
+            <a:ext cx="1100667" cy="307777"/>
+          </a:xfrm>
+          <a:prstGeom prst="rect">
+            <a:avLst/>
+          </a:prstGeom>
+          <a:noFill/>
+        </p:spPr>
         <p:txBody>
-          <a:bodyPr/>
+          <a:bodyPr wrap="square" rtlCol="0">
+            <a:spAutoFit/>
+          </a:bodyPr>
           <a:lstStyle/>
           <a:p>
-            <a:fld id="{74DDA11D-2719-4AB3-AAA7-DB2910A56E08}" type="slidenum">
-              <a:rPr lang="en-GB" smtClean="0"/>
-              <a:t>10</a:t>
-            </a:fld>
-            <a:endParaRPr lang="en-GB"/>
+            <a:pPr algn="r"/>
+            <a:r>
+              <a:rPr lang="fr-FR" sz="1400" noProof="0" dirty="0">
+                <a:latin typeface="Times New Roman" panose="02020603050405020304" pitchFamily="18" charset="0"/>
+                <a:cs typeface="Times New Roman" panose="02020603050405020304" pitchFamily="18" charset="0"/>
+              </a:rPr>
+              <a:t>X/Y</a:t>
+            </a:r>
           </a:p>
         </p:txBody>
       </p:sp>
@@ -8294,7 +8446,7 @@
                 <a:latin typeface="Times New Roman" panose="02020603050405020304" pitchFamily="18" charset="0"/>
                 <a:cs typeface="Times New Roman" panose="02020603050405020304" pitchFamily="18" charset="0"/>
               </a:rPr>
-              <a:t>3. Conclusion sur la vérification de solution </a:t>
+              <a:t>4. Conclusion sur la vérification de solution </a:t>
             </a:r>
           </a:p>
           <a:p>
@@ -9681,11 +9833,32 @@
               <a:t>A partir de ces deux graphiques, nous pouvons générer un fichier de couples de données d’entrées que nous utiliserons dans nos simulations sur Ansys. La dernière boucle du script permet de générer ce fichier ‘</a:t>
             </a:r>
             <a:r>
+              <a:rPr lang="fr-FR" i="1" noProof="0" dirty="0" err="1">
+                <a:latin typeface="Times New Roman" panose="02020603050405020304" pitchFamily="18" charset="0"/>
+                <a:cs typeface="Times New Roman" panose="02020603050405020304" pitchFamily="18" charset="0"/>
+              </a:rPr>
+              <a:t>Couples_LHS</a:t>
+            </a:r>
+            <a:r>
               <a:rPr lang="fr-FR" i="1" noProof="0" dirty="0">
                 <a:latin typeface="Times New Roman" panose="02020603050405020304" pitchFamily="18" charset="0"/>
                 <a:cs typeface="Times New Roman" panose="02020603050405020304" pitchFamily="18" charset="0"/>
               </a:rPr>
-              <a:t>Couples_LHS_Complets.csv</a:t>
+              <a:t>_</a:t>
+            </a:r>
+            <a:r>
+              <a:rPr lang="fr-FR" i="1" dirty="0">
+                <a:latin typeface="Times New Roman" panose="02020603050405020304" pitchFamily="18" charset="0"/>
+                <a:cs typeface="Times New Roman" panose="02020603050405020304" pitchFamily="18" charset="0"/>
+              </a:rPr>
+              <a:t>LA</a:t>
+            </a:r>
+            <a:r>
+              <a:rPr lang="fr-FR" i="1" noProof="0" dirty="0">
+                <a:latin typeface="Times New Roman" panose="02020603050405020304" pitchFamily="18" charset="0"/>
+                <a:cs typeface="Times New Roman" panose="02020603050405020304" pitchFamily="18" charset="0"/>
+              </a:rPr>
+              <a:t>.csv</a:t>
             </a:r>
             <a:r>
               <a:rPr lang="fr-FR" noProof="0" dirty="0">
@@ -38346,8 +38519,8 @@
           </a:prstGeom>
         </p:spPr>
       </p:pic>
-      <mc:AlternateContent xmlns:mc="http://schemas.openxmlformats.org/markup-compatibility/2006" xmlns:a14="http://schemas.microsoft.com/office/drawing/2010/main">
-        <mc:Choice Requires="a14">
+      <mc:AlternateContent xmlns:mc="http://schemas.openxmlformats.org/markup-compatibility/2006">
+        <mc:Choice xmlns:a14="http://schemas.microsoft.com/office/drawing/2010/main" Requires="a14">
           <p:sp>
             <p:nvSpPr>
               <p:cNvPr id="8" name="TextBox 7">
@@ -38363,7 +38536,7 @@
             <p:spPr>
               <a:xfrm>
                 <a:off x="5568381" y="1994590"/>
-                <a:ext cx="6623619" cy="2862322"/>
+                <a:ext cx="6623619" cy="3139321"/>
               </a:xfrm>
               <a:prstGeom prst="rect">
                 <a:avLst/>
@@ -38469,30 +38642,31 @@
               <a:p>
                 <a:pPr algn="just"/>
                 <a:r>
-                  <a:rPr lang="fr-FR" b="1" noProof="0" dirty="0">
-                    <a:highlight>
-                      <a:srgbClr val="FFFF00"/>
-                    </a:highlight>
+                  <a:rPr lang="fr-FR" noProof="0" dirty="0">
                     <a:latin typeface="Times New Roman" panose="02020603050405020304" pitchFamily="18" charset="0"/>
                     <a:cs typeface="Times New Roman" panose="02020603050405020304" pitchFamily="18" charset="0"/>
                   </a:rPr>
-                  <a:t>HYPOTHESE PLATEAU</a:t>
+                  <a:t>Des hypothèses sur la raison de ce plateau sont données </a:t>
+                </a:r>
+                <a:r>
+                  <a:rPr lang="fr-FR" dirty="0">
+                    <a:latin typeface="Times New Roman" panose="02020603050405020304" pitchFamily="18" charset="0"/>
+                    <a:cs typeface="Times New Roman" panose="02020603050405020304" pitchFamily="18" charset="0"/>
+                  </a:rPr>
+                  <a:t>dans </a:t>
                 </a:r>
                 <a:r>
                   <a:rPr lang="fr-FR" noProof="0" dirty="0">
-                    <a:highlight>
-                      <a:srgbClr val="FFFF00"/>
-                    </a:highlight>
                     <a:latin typeface="Times New Roman" panose="02020603050405020304" pitchFamily="18" charset="0"/>
                     <a:cs typeface="Times New Roman" panose="02020603050405020304" pitchFamily="18" charset="0"/>
                   </a:rPr>
-                  <a:t> </a:t>
+                  <a:t>quelques slides.   </a:t>
                 </a:r>
               </a:p>
             </p:txBody>
           </p:sp>
         </mc:Choice>
-        <mc:Fallback xmlns="">
+        <mc:Fallback>
           <p:sp>
             <p:nvSpPr>
               <p:cNvPr id="8" name="TextBox 7">
@@ -38510,7 +38684,7 @@
             <p:spPr>
               <a:xfrm>
                 <a:off x="5568381" y="1994590"/>
-                <a:ext cx="6623619" cy="2862322"/>
+                <a:ext cx="6623619" cy="3139321"/>
               </a:xfrm>
               <a:prstGeom prst="rect">
                 <a:avLst/>
@@ -38518,7 +38692,7 @@
               <a:blipFill>
                 <a:blip r:embed="rId3"/>
                 <a:stretch>
-                  <a:fillRect l="-736" t="-1064" r="-828" b="-2340"/>
+                  <a:fillRect l="-736" t="-971" r="-828" b="-2136"/>
                 </a:stretch>
               </a:blipFill>
             </p:spPr>
@@ -39979,7 +40153,7 @@
               <a:lstStyle/>
               <a:p>
                 <a:r>
-                  <a:rPr lang="fr-FR">
+                  <a:rPr lang="en-GB">
                     <a:noFill/>
                   </a:rPr>
                   <a:t> </a:t>
@@ -40048,12 +40222,51 @@
           </a:p>
         </p:txBody>
       </p:sp>
+      <p:sp>
+        <p:nvSpPr>
+          <p:cNvPr id="4" name="TextBox 3">
+            <a:extLst>
+              <a:ext uri="{FF2B5EF4-FFF2-40B4-BE49-F238E27FC236}">
+                <a16:creationId xmlns:a16="http://schemas.microsoft.com/office/drawing/2014/main" id="{75AA8A51-2A97-8D06-CECD-B9BDC2716E90}"/>
+              </a:ext>
+            </a:extLst>
+          </p:cNvPr>
+          <p:cNvSpPr txBox="1"/>
+          <p:nvPr/>
+        </p:nvSpPr>
+        <p:spPr>
+          <a:xfrm>
+            <a:off x="6722419" y="73201"/>
+            <a:ext cx="1953873" cy="338554"/>
+          </a:xfrm>
+          <a:prstGeom prst="rect">
+            <a:avLst/>
+          </a:prstGeom>
+          <a:noFill/>
+        </p:spPr>
+        <p:txBody>
+          <a:bodyPr wrap="square" rtlCol="0">
+            <a:spAutoFit/>
+          </a:bodyPr>
+          <a:lstStyle/>
+          <a:p>
+            <a:pPr algn="just"/>
+            <a:r>
+              <a:rPr lang="fr-FR" sz="1600" i="1" noProof="0" dirty="0">
+                <a:latin typeface="Times New Roman" panose="02020603050405020304" pitchFamily="18" charset="0"/>
+                <a:cs typeface="Times New Roman" panose="02020603050405020304" pitchFamily="18" charset="0"/>
+              </a:rPr>
+              <a:t>Cv_Asymptotique.py</a:t>
+            </a:r>
+          </a:p>
+        </p:txBody>
+      </p:sp>
       <p:pic>
         <p:nvPicPr>
-          <p:cNvPr id="3" name="Picture 2">
+          <p:cNvPr id="6" name="Picture 2">
             <a:extLst>
               <a:ext uri="{FF2B5EF4-FFF2-40B4-BE49-F238E27FC236}">
-                <a16:creationId xmlns:a16="http://schemas.microsoft.com/office/drawing/2014/main" id="{9418A06D-5188-6FDC-24BC-F87439036057}"/>
+                <a16:creationId xmlns:a16="http://schemas.microsoft.com/office/drawing/2014/main" id="{538B70F3-BB9F-2E3D-160E-BF782BAAAFD2}"/>
               </a:ext>
             </a:extLst>
           </p:cNvPr>
@@ -40095,45 +40308,6 @@
           </a:extLst>
         </p:spPr>
       </p:pic>
-      <p:sp>
-        <p:nvSpPr>
-          <p:cNvPr id="4" name="TextBox 3">
-            <a:extLst>
-              <a:ext uri="{FF2B5EF4-FFF2-40B4-BE49-F238E27FC236}">
-                <a16:creationId xmlns:a16="http://schemas.microsoft.com/office/drawing/2014/main" id="{75AA8A51-2A97-8D06-CECD-B9BDC2716E90}"/>
-              </a:ext>
-            </a:extLst>
-          </p:cNvPr>
-          <p:cNvSpPr txBox="1"/>
-          <p:nvPr/>
-        </p:nvSpPr>
-        <p:spPr>
-          <a:xfrm>
-            <a:off x="6722419" y="73201"/>
-            <a:ext cx="1953873" cy="338554"/>
-          </a:xfrm>
-          <a:prstGeom prst="rect">
-            <a:avLst/>
-          </a:prstGeom>
-          <a:noFill/>
-        </p:spPr>
-        <p:txBody>
-          <a:bodyPr wrap="square" rtlCol="0">
-            <a:spAutoFit/>
-          </a:bodyPr>
-          <a:lstStyle/>
-          <a:p>
-            <a:pPr algn="just"/>
-            <a:r>
-              <a:rPr lang="fr-FR" sz="1600" i="1" noProof="0" dirty="0">
-                <a:latin typeface="Times New Roman" panose="02020603050405020304" pitchFamily="18" charset="0"/>
-                <a:cs typeface="Times New Roman" panose="02020603050405020304" pitchFamily="18" charset="0"/>
-              </a:rPr>
-              <a:t>Cv_Asymptotique.py</a:t>
-            </a:r>
-          </a:p>
-        </p:txBody>
-      </p:sp>
     </p:spTree>
     <p:extLst>
       <p:ext uri="{BB962C8B-B14F-4D97-AF65-F5344CB8AC3E}">

</xml_diff>